<commit_message>
Added PPP to Reports
</commit_message>
<xml_diff>
--- a/reports/ds_presentation.pptx
+++ b/reports/ds_presentation.pptx
@@ -6,23 +6,25 @@
     <p:sldMasterId id="2147483657" r:id="rId5"/>
   </p:sldMasterIdLst>
   <p:notesMasterIdLst>
-    <p:notesMasterId r:id="rId15"/>
+    <p:notesMasterId r:id="rId17"/>
   </p:notesMasterIdLst>
   <p:sldIdLst>
     <p:sldId id="268" r:id="rId6"/>
-    <p:sldId id="331" r:id="rId7"/>
-    <p:sldId id="332" r:id="rId8"/>
-    <p:sldId id="326" r:id="rId9"/>
-    <p:sldId id="327" r:id="rId10"/>
-    <p:sldId id="329" r:id="rId11"/>
-    <p:sldId id="328" r:id="rId12"/>
-    <p:sldId id="330" r:id="rId13"/>
-    <p:sldId id="324" r:id="rId14"/>
+    <p:sldId id="334" r:id="rId7"/>
+    <p:sldId id="333" r:id="rId8"/>
+    <p:sldId id="331" r:id="rId9"/>
+    <p:sldId id="332" r:id="rId10"/>
+    <p:sldId id="326" r:id="rId11"/>
+    <p:sldId id="329" r:id="rId12"/>
+    <p:sldId id="328" r:id="rId13"/>
+    <p:sldId id="330" r:id="rId14"/>
+    <p:sldId id="324" r:id="rId15"/>
+    <p:sldId id="335" r:id="rId16"/>
   </p:sldIdLst>
   <p:sldSz cx="12192000" cy="6858000"/>
   <p:notesSz cx="6797675" cy="9926638"/>
   <p:custDataLst>
-    <p:tags r:id="rId16"/>
+    <p:tags r:id="rId18"/>
   </p:custDataLst>
   <p:defaultTextStyle>
     <a:defPPr>
@@ -238,7 +240,7 @@
           <a:p>
             <a:fld id="{38FC2500-6DB1-445A-812D-11E54AEFC992}" type="datetimeFigureOut">
               <a:rPr lang="de-DE" smtClean="0"/>
-              <a:t>19.05.2021</a:t>
+              <a:t>27.05.2021</a:t>
             </a:fld>
             <a:endParaRPr lang="de-DE"/>
           </a:p>
@@ -6208,7 +6210,7 @@
           <p:spPr bwMode="gray">
             <a:xfrm>
               <a:off x="479426" y="3274118"/>
-              <a:ext cx="2333624" cy="1000274"/>
+              <a:ext cx="2333624" cy="369332"/>
             </a:xfrm>
             <a:prstGeom prst="rect">
               <a:avLst/>
@@ -6221,7 +6223,7 @@
             </a:bodyPr>
             <a:lstStyle/>
             <a:p>
-              <a:pPr>
+              <a:pPr algn="ctr">
                 <a:spcBef>
                   <a:spcPts val="200"/>
                 </a:spcBef>
@@ -6230,51 +6232,10 @@
                 </a:buClr>
               </a:pPr>
               <a:r>
-                <a:rPr lang="en-US" sz="1200" b="1"/>
-                <a:t>Ginkgo Management Consulting GmbH</a:t>
+                <a:rPr lang="en-US" sz="1200" b="1" dirty="0"/>
+                <a:t>Introduction into Maintenance Approaches </a:t>
               </a:r>
-            </a:p>
-            <a:p>
-              <a:pPr>
-                <a:spcBef>
-                  <a:spcPts val="200"/>
-                </a:spcBef>
-                <a:buClr>
-                  <a:schemeClr val="tx2"/>
-                </a:buClr>
-              </a:pPr>
-              <a:r>
-                <a:rPr lang="en-US" sz="1200"/>
-                <a:t>Lehmweg 17</a:t>
-              </a:r>
-            </a:p>
-            <a:p>
-              <a:pPr>
-                <a:spcBef>
-                  <a:spcPts val="200"/>
-                </a:spcBef>
-                <a:buClr>
-                  <a:schemeClr val="tx2"/>
-                </a:buClr>
-              </a:pPr>
-              <a:r>
-                <a:rPr lang="en-US" sz="1200"/>
-                <a:t>20251 Hamburg</a:t>
-              </a:r>
-            </a:p>
-            <a:p>
-              <a:pPr>
-                <a:spcBef>
-                  <a:spcPts val="200"/>
-                </a:spcBef>
-                <a:buClr>
-                  <a:schemeClr val="tx2"/>
-                </a:buClr>
-              </a:pPr>
-              <a:r>
-                <a:rPr lang="en-US" sz="1200"/>
-                <a:t>Deutschland</a:t>
-              </a:r>
+              <a:endParaRPr lang="en-US" sz="1200" dirty="0"/>
             </a:p>
           </p:txBody>
         </p:sp>
@@ -6287,7 +6248,7 @@
           <p:spPr bwMode="gray">
             <a:xfrm>
               <a:off x="3443289" y="3274118"/>
-              <a:ext cx="2333624" cy="1210588"/>
+              <a:ext cx="2333624" cy="369332"/>
             </a:xfrm>
             <a:prstGeom prst="rect">
               <a:avLst/>
@@ -6300,7 +6261,7 @@
             </a:bodyPr>
             <a:lstStyle/>
             <a:p>
-              <a:pPr>
+              <a:pPr algn="ctr">
                 <a:spcBef>
                   <a:spcPts val="200"/>
                 </a:spcBef>
@@ -6309,73 +6270,10 @@
                 </a:buClr>
               </a:pPr>
               <a:r>
-                <a:rPr lang="en-US" sz="1200" b="1"/>
-                <a:t>Ginkgo Management Consulting China Co. Ltd.</a:t>
+                <a:rPr lang="en-US" sz="1200" b="1" dirty="0"/>
+                <a:t>Why Predictive Maintenance will benefit you</a:t>
               </a:r>
-            </a:p>
-            <a:p>
-              <a:pPr>
-                <a:spcBef>
-                  <a:spcPts val="200"/>
-                </a:spcBef>
-                <a:buClr>
-                  <a:schemeClr val="tx2"/>
-                </a:buClr>
-              </a:pPr>
-              <a:r>
-                <a:rPr lang="en-US" sz="1200"/>
-                <a:t>83 </a:t>
-              </a:r>
-              <a:r>
-                <a:rPr lang="en-US" sz="1200" err="1"/>
-                <a:t>Fumin</a:t>
-              </a:r>
-              <a:r>
-                <a:rPr lang="en-US" sz="1200"/>
-                <a:t> Road #56-08</a:t>
-              </a:r>
-            </a:p>
-            <a:p>
-              <a:pPr>
-                <a:spcBef>
-                  <a:spcPts val="200"/>
-                </a:spcBef>
-                <a:buClr>
-                  <a:schemeClr val="tx2"/>
-                </a:buClr>
-              </a:pPr>
-              <a:r>
-                <a:rPr lang="en-US" sz="1200"/>
-                <a:t>Mayfair Tower</a:t>
-              </a:r>
-            </a:p>
-            <a:p>
-              <a:pPr>
-                <a:spcBef>
-                  <a:spcPts val="200"/>
-                </a:spcBef>
-                <a:buClr>
-                  <a:schemeClr val="tx2"/>
-                </a:buClr>
-              </a:pPr>
-              <a:r>
-                <a:rPr lang="en-US" sz="1200"/>
-                <a:t>Shanghai 200040</a:t>
-              </a:r>
-            </a:p>
-            <a:p>
-              <a:pPr>
-                <a:spcBef>
-                  <a:spcPts val="200"/>
-                </a:spcBef>
-                <a:buClr>
-                  <a:schemeClr val="tx2"/>
-                </a:buClr>
-              </a:pPr>
-              <a:r>
-                <a:rPr lang="en-US" sz="1200"/>
-                <a:t>PR China</a:t>
-              </a:r>
+              <a:endParaRPr lang="en-US" sz="1200" dirty="0"/>
             </a:p>
           </p:txBody>
         </p:sp>
@@ -6388,7 +6286,7 @@
           <p:spPr bwMode="gray">
             <a:xfrm>
               <a:off x="6407152" y="3274118"/>
-              <a:ext cx="2333624" cy="1184940"/>
+              <a:ext cx="2333624" cy="184666"/>
             </a:xfrm>
             <a:prstGeom prst="rect">
               <a:avLst/>
@@ -6401,7 +6299,7 @@
             </a:bodyPr>
             <a:lstStyle/>
             <a:p>
-              <a:pPr>
+              <a:pPr algn="ctr">
                 <a:spcBef>
                   <a:spcPts val="200"/>
                 </a:spcBef>
@@ -6410,62 +6308,10 @@
                 </a:buClr>
               </a:pPr>
               <a:r>
-                <a:rPr lang="en-US" sz="1200" b="1"/>
-                <a:t>Ginkgo Management Consulting Singapore Pte. Ltd.</a:t>
+                <a:rPr lang="en-US" sz="1200" b="1" dirty="0"/>
+                <a:t>The Predictive Power in your Data</a:t>
               </a:r>
-            </a:p>
-            <a:p>
-              <a:pPr>
-                <a:spcBef>
-                  <a:spcPts val="200"/>
-                </a:spcBef>
-                <a:buClr>
-                  <a:schemeClr val="tx2"/>
-                </a:buClr>
-              </a:pPr>
-              <a:r>
-                <a:rPr lang="en-US" sz="1200"/>
-                <a:t>30 Cecil Street #19-08</a:t>
-              </a:r>
-              <a:br>
-                <a:rPr lang="en-US" sz="1200"/>
-              </a:br>
-              <a:r>
-                <a:rPr lang="en-US" sz="1200"/>
-                <a:t>Prudential Tower</a:t>
-              </a:r>
-            </a:p>
-            <a:p>
-              <a:pPr>
-                <a:spcBef>
-                  <a:spcPts val="200"/>
-                </a:spcBef>
-                <a:buClr>
-                  <a:schemeClr val="tx2"/>
-                </a:buClr>
-              </a:pPr>
-              <a:r>
-                <a:rPr lang="en-US" sz="1200" err="1"/>
-                <a:t>Singapur</a:t>
-              </a:r>
-              <a:r>
-                <a:rPr lang="en-US" sz="1200"/>
-                <a:t> 049712</a:t>
-              </a:r>
-            </a:p>
-            <a:p>
-              <a:pPr>
-                <a:spcBef>
-                  <a:spcPts val="200"/>
-                </a:spcBef>
-                <a:buClr>
-                  <a:schemeClr val="tx2"/>
-                </a:buClr>
-              </a:pPr>
-              <a:r>
-                <a:rPr lang="en-US" sz="1200"/>
-                <a:t>Singapur</a:t>
-              </a:r>
+              <a:endParaRPr lang="en-US" sz="1200" dirty="0"/>
             </a:p>
           </p:txBody>
         </p:sp>
@@ -6491,14 +6337,14 @@
             </a:bodyPr>
             <a:lstStyle/>
             <a:p>
-              <a:pPr algn="l"/>
+              <a:pPr algn="ctr"/>
               <a:r>
-                <a:rPr lang="en-US" sz="1600">
+                <a:rPr lang="en-US" sz="1600" dirty="0">
                   <a:solidFill>
                     <a:schemeClr val="tx2"/>
                   </a:solidFill>
                 </a:rPr>
-                <a:t>HAMBURG</a:t>
+                <a:t>1</a:t>
               </a:r>
             </a:p>
           </p:txBody>
@@ -6525,14 +6371,14 @@
             </a:bodyPr>
             <a:lstStyle/>
             <a:p>
-              <a:pPr algn="l"/>
+              <a:pPr algn="ctr"/>
               <a:r>
-                <a:rPr lang="en-US" sz="1600">
+                <a:rPr lang="en-US" sz="1600" dirty="0">
                   <a:solidFill>
                     <a:schemeClr val="tx2"/>
                   </a:solidFill>
                 </a:rPr>
-                <a:t>SHANGHAI</a:t>
+                <a:t>2</a:t>
               </a:r>
             </a:p>
           </p:txBody>
@@ -6559,14 +6405,14 @@
             </a:bodyPr>
             <a:lstStyle/>
             <a:p>
-              <a:pPr algn="l"/>
+              <a:pPr algn="ctr"/>
               <a:r>
-                <a:rPr lang="en-US" sz="1600">
+                <a:rPr lang="en-US" sz="1600" dirty="0">
                   <a:solidFill>
                     <a:schemeClr val="tx2"/>
                   </a:solidFill>
                 </a:rPr>
-                <a:t>SINGAPUR</a:t>
+                <a:t>3</a:t>
               </a:r>
             </a:p>
           </p:txBody>
@@ -6593,14 +6439,14 @@
             </a:bodyPr>
             <a:lstStyle/>
             <a:p>
-              <a:pPr algn="l"/>
+              <a:pPr algn="ctr"/>
               <a:r>
-                <a:rPr lang="en-US" sz="1600">
+                <a:rPr lang="en-US" sz="1600" dirty="0">
                   <a:solidFill>
                     <a:schemeClr val="tx2"/>
                   </a:solidFill>
                 </a:rPr>
-                <a:t>ZÜRICH</a:t>
+                <a:t>4</a:t>
               </a:r>
             </a:p>
           </p:txBody>
@@ -6614,7 +6460,7 @@
           <p:spPr bwMode="gray">
             <a:xfrm>
               <a:off x="9371014" y="3274118"/>
-              <a:ext cx="2333624" cy="1000274"/>
+              <a:ext cx="2333624" cy="369332"/>
             </a:xfrm>
             <a:prstGeom prst="rect">
               <a:avLst/>
@@ -6627,7 +6473,7 @@
             </a:bodyPr>
             <a:lstStyle/>
             <a:p>
-              <a:pPr>
+              <a:pPr algn="ctr">
                 <a:spcBef>
                   <a:spcPts val="200"/>
                 </a:spcBef>
@@ -6636,59 +6482,10 @@
                 </a:buClr>
               </a:pPr>
               <a:r>
-                <a:rPr lang="en-US" sz="1200" b="1"/>
-                <a:t>Ginkgo Management Consulting Schweiz GmbH</a:t>
+                <a:rPr lang="en-US" sz="1200" b="1" dirty="0"/>
+                <a:t>Next Steps with Ginkgo Analytics by your side</a:t>
               </a:r>
-            </a:p>
-            <a:p>
-              <a:pPr>
-                <a:spcBef>
-                  <a:spcPts val="200"/>
-                </a:spcBef>
-                <a:buClr>
-                  <a:schemeClr val="tx2"/>
-                </a:buClr>
-              </a:pPr>
-              <a:r>
-                <a:rPr lang="en-US" sz="1200"/>
-                <a:t>Max-</a:t>
-              </a:r>
-              <a:r>
-                <a:rPr lang="en-US" sz="1200" err="1"/>
-                <a:t>Högger</a:t>
-              </a:r>
-              <a:r>
-                <a:rPr lang="en-US" sz="1200"/>
-                <a:t>-Strasse 2</a:t>
-              </a:r>
-            </a:p>
-            <a:p>
-              <a:pPr>
-                <a:spcBef>
-                  <a:spcPts val="200"/>
-                </a:spcBef>
-                <a:buClr>
-                  <a:schemeClr val="tx2"/>
-                </a:buClr>
-              </a:pPr>
-              <a:r>
-                <a:rPr lang="en-US" sz="1200"/>
-                <a:t>8048 Zürich</a:t>
-              </a:r>
-            </a:p>
-            <a:p>
-              <a:pPr>
-                <a:spcBef>
-                  <a:spcPts val="200"/>
-                </a:spcBef>
-                <a:buClr>
-                  <a:schemeClr val="tx2"/>
-                </a:buClr>
-              </a:pPr>
-              <a:r>
-                <a:rPr lang="en-US" sz="1200"/>
-                <a:t>Schweiz</a:t>
-              </a:r>
+              <a:endParaRPr lang="en-US" sz="1200" dirty="0"/>
             </a:p>
           </p:txBody>
         </p:sp>
@@ -6809,7 +6606,7 @@
       </p:grpSp>
       <p:pic>
         <p:nvPicPr>
-          <p:cNvPr id="20" name="Grafik 19" descr="Ein Bild, das Zeichnung, Schild enthält.&#10;&#10;Automatisch generierte Beschreibung">
+          <p:cNvPr id="20" name="Grafik 19">
             <a:extLst>
               <a:ext uri="{FF2B5EF4-FFF2-40B4-BE49-F238E27FC236}">
                 <a16:creationId xmlns:a16="http://schemas.microsoft.com/office/drawing/2014/main" id="{0332DB5C-24B1-416D-BAD7-2720FF12D751}"/>
@@ -6822,21 +6619,14 @@
           <p:nvPr userDrawn="1"/>
         </p:nvPicPr>
         <p:blipFill>
-          <a:blip r:embed="rId2" cstate="print">
-            <a:extLst>
-              <a:ext uri="{28A0092B-C50C-407E-A947-70E740481C1C}">
-                <a14:useLocalDpi xmlns:a14="http://schemas.microsoft.com/office/drawing/2010/main"/>
-              </a:ext>
-            </a:extLst>
-          </a:blip>
-          <a:stretch>
-            <a:fillRect/>
-          </a:stretch>
+          <a:blip r:embed="rId2"/>
+          <a:srcRect/>
+          <a:stretch/>
         </p:blipFill>
         <p:spPr>
           <a:xfrm>
-            <a:off x="479426" y="539601"/>
-            <a:ext cx="2203200" cy="781948"/>
+            <a:off x="479426" y="558331"/>
+            <a:ext cx="2203200" cy="744488"/>
           </a:xfrm>
           <a:prstGeom prst="rect">
             <a:avLst/>
@@ -8059,6 +7849,782 @@
 </file>
 
 <file path=ppt/slideLayouts/slideLayout20.xml><?xml version="1.0" encoding="utf-8"?>
+<p:sldLayout xmlns:a="http://schemas.openxmlformats.org/drawingml/2006/main" xmlns:r="http://schemas.openxmlformats.org/officeDocument/2006/relationships" xmlns:p="http://schemas.openxmlformats.org/presentationml/2006/main" showMasterSp="0" preserve="1" userDrawn="1">
+  <p:cSld name="1_Standorte ohne Bilder EN">
+    <p:spTree>
+      <p:nvGrpSpPr>
+        <p:cNvPr id="1" name=""/>
+        <p:cNvGrpSpPr/>
+        <p:nvPr/>
+      </p:nvGrpSpPr>
+      <p:grpSpPr>
+        <a:xfrm>
+          <a:off x="0" y="0"/>
+          <a:ext cx="0" cy="0"/>
+          <a:chOff x="0" y="0"/>
+          <a:chExt cx="0" cy="0"/>
+        </a:xfrm>
+      </p:grpSpPr>
+      <p:graphicFrame>
+        <p:nvGraphicFramePr>
+          <p:cNvPr id="2" name="Objekt 1" hidden="1">
+            <a:extLst>
+              <a:ext uri="{FF2B5EF4-FFF2-40B4-BE49-F238E27FC236}">
+                <a16:creationId xmlns:a16="http://schemas.microsoft.com/office/drawing/2014/main" id="{ED3C86F6-9B61-436D-ACF9-A09D4BD42C52}"/>
+              </a:ext>
+            </a:extLst>
+          </p:cNvPr>
+          <p:cNvGraphicFramePr>
+            <a:graphicFrameLocks noChangeAspect="1"/>
+          </p:cNvGraphicFramePr>
+          <p:nvPr userDrawn="1">
+            <p:custDataLst>
+              <p:tags r:id="rId1"/>
+            </p:custDataLst>
+            <p:extLst>
+              <p:ext uri="{D42A27DB-BD31-4B8C-83A1-F6EECF244321}">
+                <p14:modId xmlns:p14="http://schemas.microsoft.com/office/powerpoint/2010/main" val="4012466279"/>
+              </p:ext>
+            </p:extLst>
+          </p:nvPr>
+        </p:nvGraphicFramePr>
+        <p:xfrm>
+          <a:off x="1588" y="1588"/>
+          <a:ext cx="1588" cy="1588"/>
+        </p:xfrm>
+        <a:graphic>
+          <a:graphicData uri="http://schemas.openxmlformats.org/presentationml/2006/ole">
+            <mc:AlternateContent xmlns:mc="http://schemas.openxmlformats.org/markup-compatibility/2006">
+              <mc:Choice xmlns:v="urn:schemas-microsoft-com:vml" Requires="v">
+                <p:oleObj name="think-cell Folie" r:id="rId3" imgW="395" imgH="394" progId="TCLayout.ActiveDocument.1">
+                  <p:embed/>
+                </p:oleObj>
+              </mc:Choice>
+              <mc:Fallback>
+                <p:oleObj name="think-cell Folie" r:id="rId3" imgW="395" imgH="394" progId="TCLayout.ActiveDocument.1">
+                  <p:embed/>
+                  <p:pic>
+                    <p:nvPicPr>
+                      <p:cNvPr id="2" name="Objekt 1" hidden="1">
+                        <a:extLst>
+                          <a:ext uri="{FF2B5EF4-FFF2-40B4-BE49-F238E27FC236}">
+                            <a16:creationId xmlns:a16="http://schemas.microsoft.com/office/drawing/2014/main" id="{ED3C86F6-9B61-436D-ACF9-A09D4BD42C52}"/>
+                          </a:ext>
+                        </a:extLst>
+                      </p:cNvPr>
+                      <p:cNvPicPr/>
+                      <p:nvPr/>
+                    </p:nvPicPr>
+                    <p:blipFill>
+                      <a:blip r:embed="rId4"/>
+                      <a:stretch>
+                        <a:fillRect/>
+                      </a:stretch>
+                    </p:blipFill>
+                    <p:spPr>
+                      <a:xfrm>
+                        <a:off x="1588" y="1588"/>
+                        <a:ext cx="1588" cy="1588"/>
+                      </a:xfrm>
+                      <a:prstGeom prst="rect">
+                        <a:avLst/>
+                      </a:prstGeom>
+                    </p:spPr>
+                  </p:pic>
+                </p:oleObj>
+              </mc:Fallback>
+            </mc:AlternateContent>
+          </a:graphicData>
+        </a:graphic>
+      </p:graphicFrame>
+      <p:cxnSp>
+        <p:nvCxnSpPr>
+          <p:cNvPr id="16" name="Gerader Verbinder 15"/>
+          <p:cNvCxnSpPr/>
+          <p:nvPr userDrawn="1"/>
+        </p:nvCxnSpPr>
+        <p:spPr bwMode="gray">
+          <a:xfrm>
+            <a:off x="0" y="1420813"/>
+            <a:ext cx="12192000" cy="0"/>
+          </a:xfrm>
+          <a:prstGeom prst="line">
+            <a:avLst/>
+          </a:prstGeom>
+          <a:ln w="9525">
+            <a:solidFill>
+              <a:schemeClr val="tx2"/>
+            </a:solidFill>
+          </a:ln>
+        </p:spPr>
+        <p:style>
+          <a:lnRef idx="1">
+            <a:schemeClr val="accent1"/>
+          </a:lnRef>
+          <a:fillRef idx="0">
+            <a:schemeClr val="accent1"/>
+          </a:fillRef>
+          <a:effectRef idx="0">
+            <a:schemeClr val="accent1"/>
+          </a:effectRef>
+          <a:fontRef idx="minor">
+            <a:schemeClr val="tx1"/>
+          </a:fontRef>
+        </p:style>
+      </p:cxnSp>
+      <p:sp>
+        <p:nvSpPr>
+          <p:cNvPr id="11" name="Textfeld 10"/>
+          <p:cNvSpPr txBox="1"/>
+          <p:nvPr userDrawn="1"/>
+        </p:nvSpPr>
+        <p:spPr bwMode="gray">
+          <a:xfrm>
+            <a:off x="479426" y="2984646"/>
+            <a:ext cx="2333624" cy="246221"/>
+          </a:xfrm>
+          <a:prstGeom prst="rect">
+            <a:avLst/>
+          </a:prstGeom>
+          <a:noFill/>
+        </p:spPr>
+        <p:txBody>
+          <a:bodyPr wrap="square" lIns="0" tIns="0" rIns="0" bIns="0" rtlCol="0" anchor="b">
+            <a:spAutoFit/>
+          </a:bodyPr>
+          <a:lstStyle/>
+          <a:p>
+            <a:pPr algn="l"/>
+            <a:r>
+              <a:rPr lang="en-US" sz="1600" dirty="0">
+                <a:solidFill>
+                  <a:schemeClr val="tx2"/>
+                </a:solidFill>
+              </a:rPr>
+              <a:t>HAMBURG</a:t>
+            </a:r>
+          </a:p>
+        </p:txBody>
+      </p:sp>
+      <p:sp>
+        <p:nvSpPr>
+          <p:cNvPr id="12" name="Textfeld 11"/>
+          <p:cNvSpPr txBox="1"/>
+          <p:nvPr userDrawn="1"/>
+        </p:nvSpPr>
+        <p:spPr bwMode="gray">
+          <a:xfrm>
+            <a:off x="3443289" y="2984646"/>
+            <a:ext cx="2333624" cy="246221"/>
+          </a:xfrm>
+          <a:prstGeom prst="rect">
+            <a:avLst/>
+          </a:prstGeom>
+          <a:noFill/>
+        </p:spPr>
+        <p:txBody>
+          <a:bodyPr wrap="square" lIns="0" tIns="0" rIns="0" bIns="0" rtlCol="0" anchor="b">
+            <a:spAutoFit/>
+          </a:bodyPr>
+          <a:lstStyle/>
+          <a:p>
+            <a:pPr algn="l"/>
+            <a:r>
+              <a:rPr lang="en-US" sz="1600">
+                <a:solidFill>
+                  <a:schemeClr val="tx2"/>
+                </a:solidFill>
+              </a:rPr>
+              <a:t>SHANGHAI</a:t>
+            </a:r>
+          </a:p>
+        </p:txBody>
+      </p:sp>
+      <p:sp>
+        <p:nvSpPr>
+          <p:cNvPr id="13" name="Textfeld 12"/>
+          <p:cNvSpPr txBox="1"/>
+          <p:nvPr userDrawn="1"/>
+        </p:nvSpPr>
+        <p:spPr bwMode="gray">
+          <a:xfrm>
+            <a:off x="6407152" y="2984646"/>
+            <a:ext cx="2333624" cy="246221"/>
+          </a:xfrm>
+          <a:prstGeom prst="rect">
+            <a:avLst/>
+          </a:prstGeom>
+          <a:noFill/>
+        </p:spPr>
+        <p:txBody>
+          <a:bodyPr wrap="square" lIns="0" tIns="0" rIns="0" bIns="0" rtlCol="0" anchor="b">
+            <a:spAutoFit/>
+          </a:bodyPr>
+          <a:lstStyle/>
+          <a:p>
+            <a:pPr algn="l"/>
+            <a:r>
+              <a:rPr lang="en-US" sz="1600">
+                <a:solidFill>
+                  <a:schemeClr val="tx2"/>
+                </a:solidFill>
+              </a:rPr>
+              <a:t>SINGAPORE</a:t>
+            </a:r>
+          </a:p>
+        </p:txBody>
+      </p:sp>
+      <p:sp>
+        <p:nvSpPr>
+          <p:cNvPr id="14" name="Textfeld 13"/>
+          <p:cNvSpPr txBox="1"/>
+          <p:nvPr userDrawn="1"/>
+        </p:nvSpPr>
+        <p:spPr bwMode="gray">
+          <a:xfrm>
+            <a:off x="9371014" y="2984646"/>
+            <a:ext cx="2333624" cy="246221"/>
+          </a:xfrm>
+          <a:prstGeom prst="rect">
+            <a:avLst/>
+          </a:prstGeom>
+          <a:noFill/>
+        </p:spPr>
+        <p:txBody>
+          <a:bodyPr wrap="square" lIns="0" tIns="0" rIns="0" bIns="0" rtlCol="0" anchor="b">
+            <a:spAutoFit/>
+          </a:bodyPr>
+          <a:lstStyle/>
+          <a:p>
+            <a:pPr algn="l"/>
+            <a:r>
+              <a:rPr lang="en-US" sz="1600">
+                <a:solidFill>
+                  <a:schemeClr val="tx2"/>
+                </a:solidFill>
+              </a:rPr>
+              <a:t>ZURICH</a:t>
+            </a:r>
+          </a:p>
+        </p:txBody>
+      </p:sp>
+      <p:cxnSp>
+        <p:nvCxnSpPr>
+          <p:cNvPr id="17" name="Gerader Verbinder 16"/>
+          <p:cNvCxnSpPr/>
+          <p:nvPr userDrawn="1"/>
+        </p:nvCxnSpPr>
+        <p:spPr bwMode="gray">
+          <a:xfrm rot="16200000">
+            <a:off x="2051989" y="4060826"/>
+            <a:ext cx="2152359" cy="0"/>
+          </a:xfrm>
+          <a:prstGeom prst="line">
+            <a:avLst/>
+          </a:prstGeom>
+          <a:ln w="9525">
+            <a:solidFill>
+              <a:schemeClr val="tx1">
+                <a:lumMod val="40000"/>
+                <a:lumOff val="60000"/>
+              </a:schemeClr>
+            </a:solidFill>
+          </a:ln>
+        </p:spPr>
+        <p:style>
+          <a:lnRef idx="1">
+            <a:schemeClr val="accent1"/>
+          </a:lnRef>
+          <a:fillRef idx="0">
+            <a:schemeClr val="accent1"/>
+          </a:fillRef>
+          <a:effectRef idx="0">
+            <a:schemeClr val="accent1"/>
+          </a:effectRef>
+          <a:fontRef idx="minor">
+            <a:schemeClr val="tx1"/>
+          </a:fontRef>
+        </p:style>
+      </p:cxnSp>
+      <p:cxnSp>
+        <p:nvCxnSpPr>
+          <p:cNvPr id="18" name="Gerader Verbinder 17"/>
+          <p:cNvCxnSpPr/>
+          <p:nvPr userDrawn="1"/>
+        </p:nvCxnSpPr>
+        <p:spPr bwMode="gray">
+          <a:xfrm rot="16200000">
+            <a:off x="5015853" y="4060826"/>
+            <a:ext cx="2152359" cy="0"/>
+          </a:xfrm>
+          <a:prstGeom prst="line">
+            <a:avLst/>
+          </a:prstGeom>
+          <a:ln w="9525">
+            <a:solidFill>
+              <a:schemeClr val="tx1">
+                <a:lumMod val="40000"/>
+                <a:lumOff val="60000"/>
+              </a:schemeClr>
+            </a:solidFill>
+          </a:ln>
+        </p:spPr>
+        <p:style>
+          <a:lnRef idx="1">
+            <a:schemeClr val="accent1"/>
+          </a:lnRef>
+          <a:fillRef idx="0">
+            <a:schemeClr val="accent1"/>
+          </a:fillRef>
+          <a:effectRef idx="0">
+            <a:schemeClr val="accent1"/>
+          </a:effectRef>
+          <a:fontRef idx="minor">
+            <a:schemeClr val="tx1"/>
+          </a:fontRef>
+        </p:style>
+      </p:cxnSp>
+      <p:cxnSp>
+        <p:nvCxnSpPr>
+          <p:cNvPr id="19" name="Gerader Verbinder 18"/>
+          <p:cNvCxnSpPr/>
+          <p:nvPr userDrawn="1"/>
+        </p:nvCxnSpPr>
+        <p:spPr bwMode="gray">
+          <a:xfrm rot="16200000">
+            <a:off x="7979715" y="4060827"/>
+            <a:ext cx="2152359" cy="0"/>
+          </a:xfrm>
+          <a:prstGeom prst="line">
+            <a:avLst/>
+          </a:prstGeom>
+          <a:ln w="9525">
+            <a:solidFill>
+              <a:schemeClr val="tx1">
+                <a:lumMod val="40000"/>
+                <a:lumOff val="60000"/>
+              </a:schemeClr>
+            </a:solidFill>
+          </a:ln>
+        </p:spPr>
+        <p:style>
+          <a:lnRef idx="1">
+            <a:schemeClr val="accent1"/>
+          </a:lnRef>
+          <a:fillRef idx="0">
+            <a:schemeClr val="accent1"/>
+          </a:fillRef>
+          <a:effectRef idx="0">
+            <a:schemeClr val="accent1"/>
+          </a:effectRef>
+          <a:fontRef idx="minor">
+            <a:schemeClr val="tx1"/>
+          </a:fontRef>
+        </p:style>
+      </p:cxnSp>
+      <p:sp>
+        <p:nvSpPr>
+          <p:cNvPr id="20" name="Textfeld 19"/>
+          <p:cNvSpPr txBox="1"/>
+          <p:nvPr userDrawn="1"/>
+        </p:nvSpPr>
+        <p:spPr bwMode="gray">
+          <a:xfrm>
+            <a:off x="479426" y="3321123"/>
+            <a:ext cx="2333624" cy="1000274"/>
+          </a:xfrm>
+          <a:prstGeom prst="rect">
+            <a:avLst/>
+          </a:prstGeom>
+          <a:noFill/>
+        </p:spPr>
+        <p:txBody>
+          <a:bodyPr wrap="square" lIns="0" tIns="0" rIns="0" bIns="0" rtlCol="0">
+            <a:spAutoFit/>
+          </a:bodyPr>
+          <a:lstStyle/>
+          <a:p>
+            <a:pPr algn="l">
+              <a:spcBef>
+                <a:spcPts val="200"/>
+              </a:spcBef>
+              <a:buClr>
+                <a:schemeClr val="tx2"/>
+              </a:buClr>
+            </a:pPr>
+            <a:r>
+              <a:rPr lang="en-US" sz="1200" b="1"/>
+              <a:t>Ginkgo Management Consulting GmbH</a:t>
+            </a:r>
+          </a:p>
+          <a:p>
+            <a:pPr algn="l">
+              <a:spcBef>
+                <a:spcPts val="200"/>
+              </a:spcBef>
+              <a:buClr>
+                <a:schemeClr val="tx2"/>
+              </a:buClr>
+            </a:pPr>
+            <a:r>
+              <a:rPr lang="en-US" sz="1200"/>
+              <a:t>Lehmweg 17</a:t>
+            </a:r>
+          </a:p>
+          <a:p>
+            <a:pPr algn="l">
+              <a:spcBef>
+                <a:spcPts val="200"/>
+              </a:spcBef>
+              <a:buClr>
+                <a:schemeClr val="tx2"/>
+              </a:buClr>
+            </a:pPr>
+            <a:r>
+              <a:rPr lang="en-US" sz="1200"/>
+              <a:t>20251 Hamburg</a:t>
+            </a:r>
+          </a:p>
+          <a:p>
+            <a:pPr algn="l">
+              <a:spcBef>
+                <a:spcPts val="200"/>
+              </a:spcBef>
+              <a:buClr>
+                <a:schemeClr val="tx2"/>
+              </a:buClr>
+            </a:pPr>
+            <a:r>
+              <a:rPr lang="en-US" sz="1200"/>
+              <a:t>Germany</a:t>
+            </a:r>
+          </a:p>
+        </p:txBody>
+      </p:sp>
+      <p:sp>
+        <p:nvSpPr>
+          <p:cNvPr id="22" name="Textfeld 21"/>
+          <p:cNvSpPr txBox="1"/>
+          <p:nvPr userDrawn="1"/>
+        </p:nvSpPr>
+        <p:spPr bwMode="gray">
+          <a:xfrm>
+            <a:off x="3443289" y="3321123"/>
+            <a:ext cx="2333624" cy="1210588"/>
+          </a:xfrm>
+          <a:prstGeom prst="rect">
+            <a:avLst/>
+          </a:prstGeom>
+          <a:noFill/>
+        </p:spPr>
+        <p:txBody>
+          <a:bodyPr wrap="square" lIns="0" tIns="0" rIns="0" bIns="0" rtlCol="0">
+            <a:spAutoFit/>
+          </a:bodyPr>
+          <a:lstStyle/>
+          <a:p>
+            <a:pPr>
+              <a:spcBef>
+                <a:spcPts val="200"/>
+              </a:spcBef>
+              <a:buClr>
+                <a:schemeClr val="tx2"/>
+              </a:buClr>
+            </a:pPr>
+            <a:r>
+              <a:rPr lang="en-US" sz="1200" b="1"/>
+              <a:t>Ginkgo Management Consulting China Co. Ltd.</a:t>
+            </a:r>
+          </a:p>
+          <a:p>
+            <a:pPr>
+              <a:spcBef>
+                <a:spcPts val="200"/>
+              </a:spcBef>
+              <a:buClr>
+                <a:schemeClr val="tx2"/>
+              </a:buClr>
+            </a:pPr>
+            <a:r>
+              <a:rPr lang="en-US" sz="1200"/>
+              <a:t>83 </a:t>
+            </a:r>
+            <a:r>
+              <a:rPr lang="en-US" sz="1200" err="1"/>
+              <a:t>Fumin</a:t>
+            </a:r>
+            <a:r>
+              <a:rPr lang="en-US" sz="1200"/>
+              <a:t> Road #56-08</a:t>
+            </a:r>
+          </a:p>
+          <a:p>
+            <a:pPr>
+              <a:spcBef>
+                <a:spcPts val="200"/>
+              </a:spcBef>
+              <a:buClr>
+                <a:schemeClr val="tx2"/>
+              </a:buClr>
+            </a:pPr>
+            <a:r>
+              <a:rPr lang="en-US" sz="1200"/>
+              <a:t>Mayfair Tower</a:t>
+            </a:r>
+          </a:p>
+          <a:p>
+            <a:pPr>
+              <a:spcBef>
+                <a:spcPts val="200"/>
+              </a:spcBef>
+              <a:buClr>
+                <a:schemeClr val="tx2"/>
+              </a:buClr>
+            </a:pPr>
+            <a:r>
+              <a:rPr lang="en-US" sz="1200"/>
+              <a:t>Shanghai 200040</a:t>
+            </a:r>
+          </a:p>
+          <a:p>
+            <a:pPr>
+              <a:spcBef>
+                <a:spcPts val="200"/>
+              </a:spcBef>
+              <a:buClr>
+                <a:schemeClr val="tx2"/>
+              </a:buClr>
+            </a:pPr>
+            <a:r>
+              <a:rPr lang="en-US" sz="1200"/>
+              <a:t>PR China</a:t>
+            </a:r>
+          </a:p>
+        </p:txBody>
+      </p:sp>
+      <p:sp>
+        <p:nvSpPr>
+          <p:cNvPr id="23" name="Textfeld 22"/>
+          <p:cNvSpPr txBox="1"/>
+          <p:nvPr userDrawn="1"/>
+        </p:nvSpPr>
+        <p:spPr bwMode="gray">
+          <a:xfrm>
+            <a:off x="6407152" y="3321123"/>
+            <a:ext cx="2333624" cy="1184940"/>
+          </a:xfrm>
+          <a:prstGeom prst="rect">
+            <a:avLst/>
+          </a:prstGeom>
+          <a:noFill/>
+        </p:spPr>
+        <p:txBody>
+          <a:bodyPr wrap="square" lIns="0" tIns="0" rIns="0" bIns="0" rtlCol="0">
+            <a:spAutoFit/>
+          </a:bodyPr>
+          <a:lstStyle/>
+          <a:p>
+            <a:pPr algn="l">
+              <a:spcBef>
+                <a:spcPts val="200"/>
+              </a:spcBef>
+              <a:buClr>
+                <a:schemeClr val="tx2"/>
+              </a:buClr>
+            </a:pPr>
+            <a:r>
+              <a:rPr lang="en-US" sz="1200" b="1"/>
+              <a:t>Ginkgo Management Consulting Singapore Pte. Ltd.</a:t>
+            </a:r>
+          </a:p>
+          <a:p>
+            <a:pPr algn="l">
+              <a:spcBef>
+                <a:spcPts val="200"/>
+              </a:spcBef>
+              <a:buClr>
+                <a:schemeClr val="tx2"/>
+              </a:buClr>
+            </a:pPr>
+            <a:r>
+              <a:rPr lang="en-US" sz="1200"/>
+              <a:t>30 Cecil Street #19-08</a:t>
+            </a:r>
+            <a:br>
+              <a:rPr lang="en-US" sz="1200"/>
+            </a:br>
+            <a:r>
+              <a:rPr lang="en-US" sz="1200"/>
+              <a:t>Prudential Tower</a:t>
+            </a:r>
+          </a:p>
+          <a:p>
+            <a:pPr algn="l">
+              <a:spcBef>
+                <a:spcPts val="200"/>
+              </a:spcBef>
+              <a:buClr>
+                <a:schemeClr val="tx2"/>
+              </a:buClr>
+            </a:pPr>
+            <a:r>
+              <a:rPr lang="en-US" sz="1200"/>
+              <a:t>Singapore 049712</a:t>
+            </a:r>
+          </a:p>
+          <a:p>
+            <a:pPr algn="l">
+              <a:spcBef>
+                <a:spcPts val="200"/>
+              </a:spcBef>
+              <a:buClr>
+                <a:schemeClr val="tx2"/>
+              </a:buClr>
+            </a:pPr>
+            <a:r>
+              <a:rPr lang="en-US" sz="1200"/>
+              <a:t>Singapore</a:t>
+            </a:r>
+          </a:p>
+        </p:txBody>
+      </p:sp>
+      <p:sp>
+        <p:nvSpPr>
+          <p:cNvPr id="24" name="Textfeld 23"/>
+          <p:cNvSpPr txBox="1"/>
+          <p:nvPr userDrawn="1"/>
+        </p:nvSpPr>
+        <p:spPr bwMode="gray">
+          <a:xfrm>
+            <a:off x="9371014" y="3321123"/>
+            <a:ext cx="2333624" cy="1000274"/>
+          </a:xfrm>
+          <a:prstGeom prst="rect">
+            <a:avLst/>
+          </a:prstGeom>
+          <a:noFill/>
+        </p:spPr>
+        <p:txBody>
+          <a:bodyPr wrap="square" lIns="0" tIns="0" rIns="0" bIns="0" rtlCol="0">
+            <a:spAutoFit/>
+          </a:bodyPr>
+          <a:lstStyle/>
+          <a:p>
+            <a:pPr algn="l">
+              <a:spcBef>
+                <a:spcPts val="200"/>
+              </a:spcBef>
+              <a:buClr>
+                <a:schemeClr val="tx2"/>
+              </a:buClr>
+            </a:pPr>
+            <a:r>
+              <a:rPr lang="en-US" sz="1200" b="1"/>
+              <a:t>Ginkgo Management Consulting Schweiz GmbH</a:t>
+            </a:r>
+          </a:p>
+          <a:p>
+            <a:pPr>
+              <a:spcBef>
+                <a:spcPts val="200"/>
+              </a:spcBef>
+              <a:buClr>
+                <a:schemeClr val="tx2"/>
+              </a:buClr>
+            </a:pPr>
+            <a:r>
+              <a:rPr lang="en-US" sz="1200"/>
+              <a:t>Max-</a:t>
+            </a:r>
+            <a:r>
+              <a:rPr lang="en-US" sz="1200" err="1"/>
+              <a:t>Högger</a:t>
+            </a:r>
+            <a:r>
+              <a:rPr lang="en-US" sz="1200"/>
+              <a:t>-Strasse 2</a:t>
+            </a:r>
+          </a:p>
+          <a:p>
+            <a:pPr>
+              <a:spcBef>
+                <a:spcPts val="200"/>
+              </a:spcBef>
+              <a:buClr>
+                <a:schemeClr val="tx2"/>
+              </a:buClr>
+            </a:pPr>
+            <a:r>
+              <a:rPr lang="en-US" sz="1200"/>
+              <a:t>8048 Zurich</a:t>
+            </a:r>
+          </a:p>
+          <a:p>
+            <a:pPr algn="l">
+              <a:spcBef>
+                <a:spcPts val="200"/>
+              </a:spcBef>
+              <a:buClr>
+                <a:schemeClr val="tx2"/>
+              </a:buClr>
+            </a:pPr>
+            <a:r>
+              <a:rPr lang="en-US" sz="1200"/>
+              <a:t>Switzerland</a:t>
+            </a:r>
+          </a:p>
+        </p:txBody>
+      </p:sp>
+      <p:pic>
+        <p:nvPicPr>
+          <p:cNvPr id="15" name="Grafik 14" descr="Ein Bild, das Zeichnung, Schild enthält.&#10;&#10;Automatisch generierte Beschreibung">
+            <a:extLst>
+              <a:ext uri="{FF2B5EF4-FFF2-40B4-BE49-F238E27FC236}">
+                <a16:creationId xmlns:a16="http://schemas.microsoft.com/office/drawing/2014/main" id="{C6E7A02C-F3D9-4E10-B0FC-D04F8D20142B}"/>
+              </a:ext>
+            </a:extLst>
+          </p:cNvPr>
+          <p:cNvPicPr>
+            <a:picLocks noChangeAspect="1"/>
+          </p:cNvPicPr>
+          <p:nvPr userDrawn="1"/>
+        </p:nvPicPr>
+        <p:blipFill>
+          <a:blip r:embed="rId5" cstate="print">
+            <a:extLst>
+              <a:ext uri="{28A0092B-C50C-407E-A947-70E740481C1C}">
+                <a14:useLocalDpi xmlns:a14="http://schemas.microsoft.com/office/drawing/2010/main"/>
+              </a:ext>
+            </a:extLst>
+          </a:blip>
+          <a:stretch>
+            <a:fillRect/>
+          </a:stretch>
+        </p:blipFill>
+        <p:spPr>
+          <a:xfrm>
+            <a:off x="479426" y="539601"/>
+            <a:ext cx="2203200" cy="781948"/>
+          </a:xfrm>
+          <a:prstGeom prst="rect">
+            <a:avLst/>
+          </a:prstGeom>
+        </p:spPr>
+      </p:pic>
+    </p:spTree>
+    <p:extLst>
+      <p:ext uri="{BB962C8B-B14F-4D97-AF65-F5344CB8AC3E}">
+        <p14:creationId xmlns:p14="http://schemas.microsoft.com/office/powerpoint/2010/main" val="2725381689"/>
+      </p:ext>
+    </p:extLst>
+  </p:cSld>
+  <p:clrMapOvr>
+    <a:masterClrMapping/>
+  </p:clrMapOvr>
+</p:sldLayout>
+</file>
+
+<file path=ppt/slideLayouts/slideLayout21.xml><?xml version="1.0" encoding="utf-8"?>
 <p:sldLayout xmlns:a="http://schemas.openxmlformats.org/drawingml/2006/main" xmlns:r="http://schemas.openxmlformats.org/officeDocument/2006/relationships" xmlns:p="http://schemas.openxmlformats.org/presentationml/2006/main" showMasterSp="0" preserve="1" userDrawn="1">
   <p:cSld name="kleines Logo - Deutsch">
     <p:spTree>
@@ -8262,7 +8828,7 @@
 </p:sldLayout>
 </file>
 
-<file path=ppt/slideLayouts/slideLayout21.xml><?xml version="1.0" encoding="utf-8"?>
+<file path=ppt/slideLayouts/slideLayout22.xml><?xml version="1.0" encoding="utf-8"?>
 <p:sldLayout xmlns:a="http://schemas.openxmlformats.org/drawingml/2006/main" xmlns:r="http://schemas.openxmlformats.org/officeDocument/2006/relationships" xmlns:p="http://schemas.openxmlformats.org/presentationml/2006/main" showMasterSp="0" preserve="1" userDrawn="1">
   <p:cSld name="Kleines Logo - Englisch">
     <p:spTree>
@@ -8444,7 +9010,7 @@
 </p:sldLayout>
 </file>
 
-<file path=ppt/slideLayouts/slideLayout22.xml><?xml version="1.0" encoding="utf-8"?>
+<file path=ppt/slideLayouts/slideLayout23.xml><?xml version="1.0" encoding="utf-8"?>
 <p:sldLayout xmlns:a="http://schemas.openxmlformats.org/drawingml/2006/main" xmlns:r="http://schemas.openxmlformats.org/officeDocument/2006/relationships" xmlns:p="http://schemas.openxmlformats.org/presentationml/2006/main" type="titleOnly">
   <p:cSld name="Title Only">
     <p:spTree>
@@ -8843,8 +9409,12 @@
           </a:lstStyle>
           <a:p>
             <a:r>
-              <a:rPr lang="de-DE"/>
-              <a:t>Headline</a:t>
+              <a:rPr lang="de-DE" dirty="0" err="1"/>
+              <a:t>Using</a:t>
+            </a:r>
+            <a:r>
+              <a:rPr lang="de-DE" dirty="0"/>
+              <a:t> Data </a:t>
             </a:r>
           </a:p>
         </p:txBody>
@@ -11920,7 +12490,7 @@
           </p:cNvGraphicFramePr>
           <p:nvPr userDrawn="1">
             <p:custDataLst>
-              <p:tags r:id="rId17"/>
+              <p:tags r:id="rId18"/>
             </p:custDataLst>
             <p:extLst>
               <p:ext uri="{D42A27DB-BD31-4B8C-83A1-F6EECF244321}">
@@ -11937,12 +12507,12 @@
           <a:graphicData uri="http://schemas.openxmlformats.org/presentationml/2006/ole">
             <mc:AlternateContent xmlns:mc="http://schemas.openxmlformats.org/markup-compatibility/2006">
               <mc:Choice xmlns:v="urn:schemas-microsoft-com:vml" Requires="v">
-                <p:oleObj name="think-cell Folie" r:id="rId19" imgW="305" imgH="303" progId="TCLayout.ActiveDocument.1">
+                <p:oleObj name="think-cell Folie" r:id="rId20" imgW="305" imgH="303" progId="TCLayout.ActiveDocument.1">
                   <p:embed/>
                 </p:oleObj>
               </mc:Choice>
               <mc:Fallback>
-                <p:oleObj name="think-cell Folie" r:id="rId19" imgW="305" imgH="303" progId="TCLayout.ActiveDocument.1">
+                <p:oleObj name="think-cell Folie" r:id="rId20" imgW="305" imgH="303" progId="TCLayout.ActiveDocument.1">
                   <p:embed/>
                   <p:pic>
                     <p:nvPicPr>
@@ -11951,7 +12521,7 @@
                       <p:nvPr/>
                     </p:nvPicPr>
                     <p:blipFill>
-                      <a:blip r:embed="rId20"/>
+                      <a:blip r:embed="rId21"/>
                       <a:stretch>
                         <a:fillRect/>
                       </a:stretch>
@@ -11984,7 +12554,7 @@
           <p:cNvSpPr/>
           <p:nvPr userDrawn="1">
             <p:custDataLst>
-              <p:tags r:id="rId18"/>
+              <p:tags r:id="rId19"/>
             </p:custDataLst>
           </p:nvPr>
         </p:nvSpPr>
@@ -12363,7 +12933,7 @@
           <p:nvPr userDrawn="1"/>
         </p:nvPicPr>
         <p:blipFill>
-          <a:blip r:embed="rId21" cstate="print">
+          <a:blip r:embed="rId22" cstate="print">
             <a:extLst>
               <a:ext uri="{28A0092B-C50C-407E-A947-70E740481C1C}">
                 <a14:useLocalDpi xmlns:a14="http://schemas.microsoft.com/office/drawing/2010/main"/>
@@ -12405,9 +12975,10 @@
     <p:sldLayoutId id="2147483667" r:id="rId10"/>
     <p:sldLayoutId id="2147483668" r:id="rId11"/>
     <p:sldLayoutId id="2147483669" r:id="rId12"/>
-    <p:sldLayoutId id="2147483670" r:id="rId13"/>
-    <p:sldLayoutId id="2147483671" r:id="rId14"/>
-    <p:sldLayoutId id="2147483672" r:id="rId15"/>
+    <p:sldLayoutId id="2147483673" r:id="rId13"/>
+    <p:sldLayoutId id="2147483670" r:id="rId14"/>
+    <p:sldLayoutId id="2147483671" r:id="rId15"/>
+    <p:sldLayoutId id="2147483672" r:id="rId16"/>
   </p:sldLayoutIdLst>
   <p:txStyles>
     <p:titleStyle>
@@ -12796,10 +13367,10 @@
           <a:lstStyle/>
           <a:p>
             <a:r>
-              <a:rPr lang="en-US"/>
+              <a:rPr lang="en-US" dirty="0"/>
               <a:t>Interview - Data Case</a:t>
             </a:r>
-            <a:endParaRPr lang="de-DE"/>
+            <a:endParaRPr lang="de-DE" dirty="0"/>
           </a:p>
         </p:txBody>
       </p:sp>
@@ -12824,10 +13395,61 @@
           <a:lstStyle/>
           <a:p>
             <a:r>
-              <a:rPr lang="en-US"/>
-              <a:t>Sensor Data</a:t>
-            </a:r>
-            <a:endParaRPr lang="de-DE"/>
+              <a:rPr lang="de-DE" dirty="0" err="1"/>
+              <a:t>Predictive</a:t>
+            </a:r>
+            <a:r>
+              <a:rPr lang="de-DE" dirty="0"/>
+              <a:t> Maintenance - Always </a:t>
+            </a:r>
+            <a:r>
+              <a:rPr lang="de-DE" dirty="0" err="1"/>
+              <a:t>one</a:t>
+            </a:r>
+            <a:r>
+              <a:rPr lang="de-DE" dirty="0"/>
+              <a:t> </a:t>
+            </a:r>
+            <a:r>
+              <a:rPr lang="de-DE" dirty="0" err="1"/>
+              <a:t>step</a:t>
+            </a:r>
+            <a:r>
+              <a:rPr lang="de-DE" dirty="0"/>
+              <a:t> </a:t>
+            </a:r>
+            <a:r>
+              <a:rPr lang="de-DE" dirty="0" err="1"/>
+              <a:t>ahead</a:t>
+            </a:r>
+            <a:r>
+              <a:rPr lang="de-DE" dirty="0"/>
+              <a:t> </a:t>
+            </a:r>
+            <a:r>
+              <a:rPr lang="de-DE" dirty="0" err="1"/>
+              <a:t>of</a:t>
+            </a:r>
+            <a:r>
+              <a:rPr lang="de-DE" dirty="0"/>
+              <a:t> </a:t>
+            </a:r>
+            <a:r>
+              <a:rPr lang="de-DE" dirty="0" err="1"/>
+              <a:t>failure</a:t>
+            </a:r>
+            <a:r>
+              <a:rPr lang="de-DE" dirty="0"/>
+              <a:t> </a:t>
+            </a:r>
+            <a:r>
+              <a:rPr lang="de-DE" dirty="0" err="1"/>
+              <a:t>with</a:t>
+            </a:r>
+            <a:r>
+              <a:rPr lang="de-DE" dirty="0"/>
+              <a:t> AI</a:t>
+            </a:r>
           </a:p>
         </p:txBody>
       </p:sp>
@@ -12852,7 +13474,7 @@
           <a:lstStyle/>
           <a:p>
             <a:r>
-              <a:rPr lang="de-DE"/>
+              <a:rPr lang="de-DE" dirty="0"/>
               <a:t>Hamburg, 2021</a:t>
             </a:r>
           </a:p>
@@ -12871,7 +13493,926 @@
 </p:sld>
 </file>
 
+<file path=ppt/slides/slide10.xml><?xml version="1.0" encoding="utf-8"?>
+<p:sld xmlns:a="http://schemas.openxmlformats.org/drawingml/2006/main" xmlns:r="http://schemas.openxmlformats.org/officeDocument/2006/relationships" xmlns:p="http://schemas.openxmlformats.org/presentationml/2006/main">
+  <p:cSld>
+    <p:spTree>
+      <p:nvGrpSpPr>
+        <p:cNvPr id="1" name=""/>
+        <p:cNvGrpSpPr/>
+        <p:nvPr/>
+      </p:nvGrpSpPr>
+      <p:grpSpPr>
+        <a:xfrm>
+          <a:off x="0" y="0"/>
+          <a:ext cx="0" cy="0"/>
+          <a:chOff x="0" y="0"/>
+          <a:chExt cx="0" cy="0"/>
+        </a:xfrm>
+      </p:grpSpPr>
+      <p:sp>
+        <p:nvSpPr>
+          <p:cNvPr id="2" name="Title 1">
+            <a:extLst>
+              <a:ext uri="{FF2B5EF4-FFF2-40B4-BE49-F238E27FC236}">
+                <a16:creationId xmlns:a16="http://schemas.microsoft.com/office/drawing/2014/main" id="{B4928B7A-4834-4A6A-A3FB-54AC5234173C}"/>
+              </a:ext>
+            </a:extLst>
+          </p:cNvPr>
+          <p:cNvSpPr>
+            <a:spLocks noGrp="1"/>
+          </p:cNvSpPr>
+          <p:nvPr>
+            <p:ph type="title"/>
+          </p:nvPr>
+        </p:nvSpPr>
+        <p:spPr/>
+        <p:txBody>
+          <a:bodyPr/>
+          <a:lstStyle/>
+          <a:p>
+            <a:r>
+              <a:rPr lang="de-DE" b="1" dirty="0"/>
+              <a:t>Next </a:t>
+            </a:r>
+            <a:r>
+              <a:rPr lang="de-DE" b="1" dirty="0" err="1"/>
+              <a:t>steps</a:t>
+            </a:r>
+            <a:r>
+              <a:rPr lang="de-DE" b="1" dirty="0"/>
+              <a:t> </a:t>
+            </a:r>
+            <a:r>
+              <a:rPr lang="de-DE" b="1" dirty="0" err="1"/>
+              <a:t>with</a:t>
+            </a:r>
+            <a:r>
+              <a:rPr lang="de-DE" b="1" dirty="0"/>
+              <a:t> Ginkgo Analytics </a:t>
+            </a:r>
+            <a:r>
+              <a:rPr lang="de-DE" b="1" dirty="0" err="1"/>
+              <a:t>by</a:t>
+            </a:r>
+            <a:r>
+              <a:rPr lang="de-DE" b="1" dirty="0"/>
+              <a:t> </a:t>
+            </a:r>
+            <a:r>
+              <a:rPr lang="de-DE" b="1" dirty="0" err="1"/>
+              <a:t>your</a:t>
+            </a:r>
+            <a:r>
+              <a:rPr lang="de-DE" b="1" dirty="0"/>
+              <a:t> </a:t>
+            </a:r>
+            <a:r>
+              <a:rPr lang="de-DE" b="1" dirty="0" err="1"/>
+              <a:t>side</a:t>
+            </a:r>
+            <a:endParaRPr lang="de-DE" b="1" dirty="0"/>
+          </a:p>
+        </p:txBody>
+      </p:sp>
+      <p:sp>
+        <p:nvSpPr>
+          <p:cNvPr id="3" name="Content Placeholder 2">
+            <a:extLst>
+              <a:ext uri="{FF2B5EF4-FFF2-40B4-BE49-F238E27FC236}">
+                <a16:creationId xmlns:a16="http://schemas.microsoft.com/office/drawing/2014/main" id="{67610E84-065B-4FA1-B7D1-C980464A23F0}"/>
+              </a:ext>
+            </a:extLst>
+          </p:cNvPr>
+          <p:cNvSpPr>
+            <a:spLocks noGrp="1"/>
+          </p:cNvSpPr>
+          <p:nvPr>
+            <p:ph idx="1"/>
+          </p:nvPr>
+        </p:nvSpPr>
+        <p:spPr/>
+        <p:txBody>
+          <a:bodyPr>
+            <a:normAutofit/>
+          </a:bodyPr>
+          <a:lstStyle/>
+          <a:p>
+            <a:r>
+              <a:rPr lang="de-DE" sz="1800" b="1" dirty="0" err="1"/>
+              <a:t>Determining</a:t>
+            </a:r>
+            <a:r>
+              <a:rPr lang="de-DE" sz="1800" b="1" dirty="0"/>
+              <a:t> and </a:t>
+            </a:r>
+            <a:r>
+              <a:rPr lang="de-DE" sz="1800" b="1" dirty="0" err="1"/>
+              <a:t>finding</a:t>
+            </a:r>
+            <a:r>
+              <a:rPr lang="de-DE" sz="1800" b="1" dirty="0"/>
+              <a:t> </a:t>
+            </a:r>
+            <a:r>
+              <a:rPr lang="de-DE" sz="1800" b="1" dirty="0" err="1"/>
+              <a:t>the</a:t>
+            </a:r>
+            <a:r>
+              <a:rPr lang="de-DE" sz="1800" b="1" dirty="0"/>
+              <a:t> optimal </a:t>
+            </a:r>
+            <a:r>
+              <a:rPr lang="de-DE" sz="1800" b="1" dirty="0" err="1"/>
+              <a:t>warning</a:t>
+            </a:r>
+            <a:r>
+              <a:rPr lang="de-DE" sz="1800" b="1" dirty="0"/>
+              <a:t> </a:t>
+            </a:r>
+            <a:r>
+              <a:rPr lang="de-DE" sz="1800" b="1" dirty="0" err="1"/>
+              <a:t>window</a:t>
+            </a:r>
+            <a:r>
+              <a:rPr lang="de-DE" sz="1800" b="1" dirty="0"/>
+              <a:t> </a:t>
+            </a:r>
+          </a:p>
+          <a:p>
+            <a:pPr lvl="1"/>
+            <a:r>
+              <a:rPr lang="de-DE" sz="1800" dirty="0" err="1"/>
+              <a:t>How</a:t>
+            </a:r>
+            <a:r>
+              <a:rPr lang="de-DE" sz="1800" dirty="0"/>
+              <a:t> </a:t>
+            </a:r>
+            <a:r>
+              <a:rPr lang="de-DE" sz="1800" dirty="0" err="1"/>
+              <a:t>much</a:t>
+            </a:r>
+            <a:r>
+              <a:rPr lang="de-DE" sz="1800" dirty="0"/>
+              <a:t> time do </a:t>
+            </a:r>
+            <a:r>
+              <a:rPr lang="de-DE" sz="1800" dirty="0" err="1"/>
+              <a:t>employees</a:t>
+            </a:r>
+            <a:r>
+              <a:rPr lang="de-DE" sz="1800" dirty="0"/>
+              <a:t> </a:t>
+            </a:r>
+            <a:r>
+              <a:rPr lang="de-DE" sz="1800" dirty="0" err="1"/>
+              <a:t>need</a:t>
+            </a:r>
+            <a:r>
+              <a:rPr lang="de-DE" sz="1800" dirty="0"/>
+              <a:t> in </a:t>
+            </a:r>
+            <a:r>
+              <a:rPr lang="de-DE" sz="1800" dirty="0" err="1"/>
+              <a:t>order</a:t>
+            </a:r>
+            <a:r>
+              <a:rPr lang="de-DE" sz="1800" dirty="0"/>
+              <a:t> </a:t>
+            </a:r>
+            <a:r>
+              <a:rPr lang="de-DE" sz="1800" dirty="0" err="1"/>
+              <a:t>to</a:t>
+            </a:r>
+            <a:r>
+              <a:rPr lang="de-DE" sz="1800" dirty="0"/>
+              <a:t> </a:t>
+            </a:r>
+            <a:r>
+              <a:rPr lang="de-DE" sz="1800" dirty="0" err="1"/>
+              <a:t>react</a:t>
+            </a:r>
+            <a:r>
+              <a:rPr lang="de-DE" sz="1800" dirty="0"/>
+              <a:t>?</a:t>
+            </a:r>
+          </a:p>
+          <a:p>
+            <a:pPr marL="180000" lvl="1" indent="0">
+              <a:buNone/>
+            </a:pPr>
+            <a:endParaRPr lang="de-DE" sz="1800" dirty="0"/>
+          </a:p>
+          <a:p>
+            <a:r>
+              <a:rPr lang="de-DE" sz="1800" b="1" dirty="0"/>
+              <a:t>More </a:t>
+            </a:r>
+            <a:r>
+              <a:rPr lang="de-DE" sz="1800" b="1" dirty="0" err="1"/>
+              <a:t>flexibility</a:t>
+            </a:r>
+            <a:r>
+              <a:rPr lang="de-DE" sz="1800" b="1" dirty="0"/>
+              <a:t> in </a:t>
+            </a:r>
+            <a:r>
+              <a:rPr lang="de-DE" sz="1800" b="1" dirty="0" err="1"/>
+              <a:t>the</a:t>
+            </a:r>
+            <a:r>
+              <a:rPr lang="de-DE" sz="1800" b="1" dirty="0"/>
+              <a:t> </a:t>
+            </a:r>
+            <a:r>
+              <a:rPr lang="de-DE" sz="1800" b="1" dirty="0" err="1"/>
+              <a:t>face</a:t>
+            </a:r>
+            <a:r>
+              <a:rPr lang="de-DE" sz="1800" b="1" dirty="0"/>
+              <a:t> </a:t>
+            </a:r>
+            <a:r>
+              <a:rPr lang="de-DE" sz="1800" b="1" dirty="0" err="1"/>
+              <a:t>of</a:t>
+            </a:r>
+            <a:r>
+              <a:rPr lang="de-DE" sz="1800" b="1" dirty="0"/>
+              <a:t> </a:t>
+            </a:r>
+            <a:r>
+              <a:rPr lang="de-DE" sz="1800" b="1" dirty="0" err="1"/>
+              <a:t>uncertainty</a:t>
+            </a:r>
+            <a:endParaRPr lang="de-DE" sz="1800" b="1" dirty="0"/>
+          </a:p>
+          <a:p>
+            <a:pPr lvl="1"/>
+            <a:r>
+              <a:rPr lang="de-DE" sz="1800" dirty="0" err="1"/>
+              <a:t>Priorities</a:t>
+            </a:r>
+            <a:r>
+              <a:rPr lang="de-DE" sz="1800" dirty="0"/>
+              <a:t> and </a:t>
+            </a:r>
+            <a:r>
+              <a:rPr lang="de-DE" sz="1800" dirty="0" err="1"/>
+              <a:t>opportunity</a:t>
+            </a:r>
+            <a:r>
+              <a:rPr lang="de-DE" sz="1800" dirty="0"/>
+              <a:t> </a:t>
+            </a:r>
+            <a:r>
+              <a:rPr lang="de-DE" sz="1800" dirty="0" err="1"/>
+              <a:t>costs</a:t>
+            </a:r>
+            <a:r>
+              <a:rPr lang="de-DE" sz="1800" dirty="0"/>
+              <a:t> </a:t>
+            </a:r>
+            <a:r>
+              <a:rPr lang="de-DE" sz="1800" dirty="0" err="1"/>
+              <a:t>change</a:t>
+            </a:r>
+            <a:r>
+              <a:rPr lang="de-DE" sz="1800" dirty="0"/>
+              <a:t> and </a:t>
+            </a:r>
+            <a:r>
+              <a:rPr lang="de-DE" sz="1800" dirty="0" err="1"/>
+              <a:t>the</a:t>
+            </a:r>
+            <a:r>
+              <a:rPr lang="de-DE" sz="1800" dirty="0"/>
+              <a:t> </a:t>
+            </a:r>
+            <a:r>
+              <a:rPr lang="de-DE" sz="1800" dirty="0" err="1"/>
+              <a:t>costs</a:t>
+            </a:r>
+            <a:r>
+              <a:rPr lang="de-DE" sz="1800" dirty="0"/>
+              <a:t> </a:t>
+            </a:r>
+            <a:r>
+              <a:rPr lang="de-DE" sz="1800" dirty="0" err="1"/>
+              <a:t>of</a:t>
+            </a:r>
+            <a:r>
+              <a:rPr lang="de-DE" sz="1800" dirty="0"/>
+              <a:t> </a:t>
+            </a:r>
+            <a:r>
+              <a:rPr lang="de-DE" sz="1800" dirty="0" err="1"/>
+              <a:t>failure</a:t>
+            </a:r>
+            <a:r>
+              <a:rPr lang="de-DE" sz="1800" dirty="0"/>
+              <a:t> </a:t>
+            </a:r>
+            <a:r>
+              <a:rPr lang="de-DE" sz="1800" dirty="0" err="1"/>
+              <a:t>or</a:t>
+            </a:r>
+            <a:r>
+              <a:rPr lang="de-DE" sz="1800" dirty="0"/>
+              <a:t> </a:t>
+            </a:r>
+            <a:r>
+              <a:rPr lang="de-DE" sz="1800" dirty="0" err="1"/>
+              <a:t>maintenance</a:t>
+            </a:r>
+            <a:r>
+              <a:rPr lang="de-DE" sz="1800" dirty="0"/>
+              <a:t> </a:t>
+            </a:r>
+            <a:r>
+              <a:rPr lang="de-DE" sz="1800" dirty="0" err="1"/>
+              <a:t>today</a:t>
+            </a:r>
+            <a:r>
+              <a:rPr lang="de-DE" sz="1800" dirty="0"/>
+              <a:t> </a:t>
+            </a:r>
+            <a:r>
+              <a:rPr lang="de-DE" sz="1800" dirty="0" err="1"/>
+              <a:t>might</a:t>
+            </a:r>
+            <a:r>
+              <a:rPr lang="de-DE" sz="1800" dirty="0"/>
+              <a:t> not </a:t>
+            </a:r>
+            <a:r>
+              <a:rPr lang="de-DE" sz="1800" dirty="0" err="1"/>
+              <a:t>be</a:t>
+            </a:r>
+            <a:r>
+              <a:rPr lang="de-DE" sz="1800" dirty="0"/>
+              <a:t> </a:t>
+            </a:r>
+            <a:r>
+              <a:rPr lang="de-DE" sz="1800" dirty="0" err="1"/>
+              <a:t>the</a:t>
+            </a:r>
+            <a:r>
+              <a:rPr lang="de-DE" sz="1800" dirty="0"/>
+              <a:t> </a:t>
+            </a:r>
+            <a:r>
+              <a:rPr lang="de-DE" sz="1800" dirty="0" err="1"/>
+              <a:t>costs</a:t>
+            </a:r>
+            <a:r>
+              <a:rPr lang="de-DE" sz="1800" dirty="0"/>
+              <a:t> </a:t>
+            </a:r>
+            <a:r>
+              <a:rPr lang="de-DE" sz="1800" dirty="0" err="1"/>
+              <a:t>you</a:t>
+            </a:r>
+            <a:r>
+              <a:rPr lang="de-DE" sz="1800" dirty="0"/>
+              <a:t> </a:t>
+            </a:r>
+            <a:r>
+              <a:rPr lang="de-DE" sz="1800" dirty="0" err="1"/>
+              <a:t>face</a:t>
+            </a:r>
+            <a:r>
+              <a:rPr lang="de-DE" sz="1800" dirty="0"/>
+              <a:t> </a:t>
+            </a:r>
+            <a:r>
+              <a:rPr lang="de-DE" sz="1800" dirty="0" err="1"/>
+              <a:t>tomorrow</a:t>
+            </a:r>
+            <a:endParaRPr lang="de-DE" sz="1800" dirty="0"/>
+          </a:p>
+          <a:p>
+            <a:pPr lvl="1"/>
+            <a:r>
+              <a:rPr lang="de-DE" sz="1800" dirty="0" err="1"/>
+              <a:t>We</a:t>
+            </a:r>
+            <a:r>
+              <a:rPr lang="de-DE" sz="1800" dirty="0"/>
+              <a:t> </a:t>
+            </a:r>
+            <a:r>
+              <a:rPr lang="de-DE" sz="1800" dirty="0" err="1"/>
+              <a:t>want</a:t>
+            </a:r>
+            <a:r>
+              <a:rPr lang="de-DE" sz="1800" dirty="0"/>
+              <a:t> </a:t>
+            </a:r>
+            <a:r>
+              <a:rPr lang="de-DE" sz="1800" dirty="0" err="1"/>
+              <a:t>to</a:t>
+            </a:r>
+            <a:r>
+              <a:rPr lang="de-DE" sz="1800" dirty="0"/>
+              <a:t> </a:t>
+            </a:r>
+            <a:r>
+              <a:rPr lang="de-DE" sz="1800" dirty="0" err="1"/>
+              <a:t>give</a:t>
+            </a:r>
+            <a:r>
+              <a:rPr lang="de-DE" sz="1800" dirty="0"/>
+              <a:t> </a:t>
+            </a:r>
+            <a:r>
+              <a:rPr lang="de-DE" sz="1800" dirty="0" err="1"/>
+              <a:t>you</a:t>
+            </a:r>
+            <a:r>
+              <a:rPr lang="de-DE" sz="1800" dirty="0"/>
+              <a:t> a </a:t>
+            </a:r>
+            <a:r>
+              <a:rPr lang="de-DE" sz="1800" dirty="0" err="1"/>
+              <a:t>tool</a:t>
+            </a:r>
+            <a:r>
+              <a:rPr lang="de-DE" sz="1800" dirty="0"/>
+              <a:t> </a:t>
+            </a:r>
+            <a:r>
+              <a:rPr lang="de-DE" sz="1800" dirty="0" err="1"/>
+              <a:t>that</a:t>
+            </a:r>
+            <a:r>
+              <a:rPr lang="de-DE" sz="1800" dirty="0"/>
+              <a:t> </a:t>
+            </a:r>
+            <a:r>
+              <a:rPr lang="de-DE" sz="1800" dirty="0" err="1"/>
+              <a:t>allows</a:t>
+            </a:r>
+            <a:r>
+              <a:rPr lang="de-DE" sz="1800" dirty="0"/>
+              <a:t> </a:t>
+            </a:r>
+            <a:r>
+              <a:rPr lang="de-DE" sz="1800" dirty="0" err="1"/>
+              <a:t>you</a:t>
+            </a:r>
+            <a:r>
+              <a:rPr lang="de-DE" sz="1800" dirty="0"/>
+              <a:t> </a:t>
+            </a:r>
+            <a:r>
+              <a:rPr lang="de-DE" sz="1800" dirty="0" err="1"/>
+              <a:t>to</a:t>
+            </a:r>
+            <a:r>
+              <a:rPr lang="de-DE" sz="1800" dirty="0"/>
+              <a:t> </a:t>
+            </a:r>
+            <a:r>
+              <a:rPr lang="de-DE" sz="1800" dirty="0" err="1"/>
+              <a:t>adapt</a:t>
+            </a:r>
+            <a:r>
+              <a:rPr lang="de-DE" sz="1800" dirty="0"/>
+              <a:t> </a:t>
+            </a:r>
+            <a:r>
+              <a:rPr lang="de-DE" sz="1800" dirty="0" err="1"/>
+              <a:t>to</a:t>
+            </a:r>
+            <a:r>
+              <a:rPr lang="de-DE" sz="1800" dirty="0"/>
+              <a:t> such </a:t>
+            </a:r>
+            <a:r>
+              <a:rPr lang="de-DE" sz="1800" dirty="0" err="1"/>
+              <a:t>changes</a:t>
+            </a:r>
+            <a:r>
+              <a:rPr lang="de-DE" sz="1800" dirty="0"/>
+              <a:t> </a:t>
+            </a:r>
+            <a:r>
+              <a:rPr lang="de-DE" sz="1800" dirty="0" err="1"/>
+              <a:t>by</a:t>
+            </a:r>
+            <a:r>
+              <a:rPr lang="de-DE" sz="1800" dirty="0"/>
+              <a:t> </a:t>
+            </a:r>
+            <a:r>
+              <a:rPr lang="de-DE" sz="1800" dirty="0" err="1"/>
+              <a:t>setting</a:t>
+            </a:r>
+            <a:r>
+              <a:rPr lang="de-DE" sz="1800" dirty="0"/>
+              <a:t> </a:t>
+            </a:r>
+            <a:r>
+              <a:rPr lang="de-DE" sz="1800" dirty="0" err="1"/>
+              <a:t>up</a:t>
+            </a:r>
+            <a:r>
+              <a:rPr lang="de-DE" sz="1800" dirty="0"/>
+              <a:t> a multi-</a:t>
+            </a:r>
+            <a:r>
+              <a:rPr lang="de-DE" sz="1800" dirty="0" err="1"/>
+              <a:t>classifier</a:t>
+            </a:r>
+            <a:r>
+              <a:rPr lang="de-DE" sz="1800" dirty="0"/>
+              <a:t> </a:t>
+            </a:r>
+            <a:r>
+              <a:rPr lang="de-DE" sz="1800" dirty="0" err="1"/>
+              <a:t>machine</a:t>
+            </a:r>
+            <a:r>
+              <a:rPr lang="de-DE" sz="1800" dirty="0"/>
+              <a:t> </a:t>
+            </a:r>
+            <a:r>
+              <a:rPr lang="de-DE" sz="1800" dirty="0" err="1"/>
+              <a:t>learning</a:t>
+            </a:r>
+            <a:r>
+              <a:rPr lang="de-DE" sz="1800" dirty="0"/>
+              <a:t> </a:t>
+            </a:r>
+            <a:r>
+              <a:rPr lang="de-DE" sz="1800" dirty="0" err="1"/>
+              <a:t>model</a:t>
+            </a:r>
+            <a:r>
+              <a:rPr lang="de-DE" sz="1800" dirty="0"/>
+              <a:t> </a:t>
+            </a:r>
+            <a:r>
+              <a:rPr lang="de-DE" sz="1800" dirty="0" err="1"/>
+              <a:t>that</a:t>
+            </a:r>
+            <a:r>
+              <a:rPr lang="de-DE" sz="1800" dirty="0"/>
+              <a:t> </a:t>
+            </a:r>
+            <a:r>
+              <a:rPr lang="de-DE" sz="1800" dirty="0" err="1"/>
+              <a:t>is</a:t>
+            </a:r>
+            <a:r>
+              <a:rPr lang="de-DE" sz="1800" dirty="0"/>
+              <a:t> </a:t>
+            </a:r>
+            <a:r>
+              <a:rPr lang="de-DE" sz="1800" dirty="0" err="1"/>
+              <a:t>capable</a:t>
+            </a:r>
+            <a:r>
+              <a:rPr lang="de-DE" sz="1800" dirty="0"/>
+              <a:t> </a:t>
+            </a:r>
+            <a:r>
+              <a:rPr lang="de-DE" sz="1800" dirty="0" err="1"/>
+              <a:t>of</a:t>
+            </a:r>
+            <a:r>
+              <a:rPr lang="de-DE" sz="1800" dirty="0"/>
+              <a:t> </a:t>
+            </a:r>
+            <a:r>
+              <a:rPr lang="de-DE" sz="1800" dirty="0" err="1"/>
+              <a:t>minimizing</a:t>
+            </a:r>
+            <a:r>
+              <a:rPr lang="de-DE" sz="1800" dirty="0"/>
+              <a:t> </a:t>
+            </a:r>
+            <a:r>
+              <a:rPr lang="de-DE" sz="1800" dirty="0" err="1"/>
+              <a:t>maintenance</a:t>
+            </a:r>
+            <a:r>
+              <a:rPr lang="de-DE" sz="1800" dirty="0"/>
+              <a:t> </a:t>
+            </a:r>
+            <a:r>
+              <a:rPr lang="de-DE" sz="1800" dirty="0" err="1"/>
+              <a:t>cost</a:t>
+            </a:r>
+            <a:r>
+              <a:rPr lang="de-DE" sz="1800" dirty="0"/>
+              <a:t> – on </a:t>
+            </a:r>
+            <a:r>
+              <a:rPr lang="de-DE" sz="1800" dirty="0" err="1"/>
+              <a:t>the</a:t>
+            </a:r>
+            <a:r>
+              <a:rPr lang="de-DE" sz="1800" dirty="0"/>
+              <a:t> </a:t>
+            </a:r>
+            <a:r>
+              <a:rPr lang="de-DE" sz="1800" dirty="0" err="1"/>
+              <a:t>fly</a:t>
+            </a:r>
+            <a:endParaRPr lang="de-DE" sz="1800" dirty="0"/>
+          </a:p>
+        </p:txBody>
+      </p:sp>
+      <p:sp>
+        <p:nvSpPr>
+          <p:cNvPr id="4" name="Text Placeholder 3">
+            <a:extLst>
+              <a:ext uri="{FF2B5EF4-FFF2-40B4-BE49-F238E27FC236}">
+                <a16:creationId xmlns:a16="http://schemas.microsoft.com/office/drawing/2014/main" id="{A5A1F98E-6D98-4C81-9373-91B82402ABB3}"/>
+              </a:ext>
+            </a:extLst>
+          </p:cNvPr>
+          <p:cNvSpPr>
+            <a:spLocks noGrp="1"/>
+          </p:cNvSpPr>
+          <p:nvPr>
+            <p:ph type="body" sz="quarter" idx="10"/>
+          </p:nvPr>
+        </p:nvSpPr>
+        <p:spPr>
+          <a:xfrm>
+            <a:off x="485775" y="268697"/>
+            <a:ext cx="10096500" cy="246221"/>
+          </a:xfrm>
+        </p:spPr>
+        <p:txBody>
+          <a:bodyPr/>
+          <a:lstStyle/>
+          <a:p>
+            <a:r>
+              <a:rPr lang="en-US" dirty="0"/>
+              <a:t>Predictive Maintenance - Always one step ahead of failure with AI</a:t>
+            </a:r>
+          </a:p>
+        </p:txBody>
+      </p:sp>
+    </p:spTree>
+    <p:extLst>
+      <p:ext uri="{BB962C8B-B14F-4D97-AF65-F5344CB8AC3E}">
+        <p14:creationId xmlns:p14="http://schemas.microsoft.com/office/powerpoint/2010/main" val="1942909483"/>
+      </p:ext>
+    </p:extLst>
+  </p:cSld>
+  <p:clrMapOvr>
+    <a:masterClrMapping/>
+  </p:clrMapOvr>
+</p:sld>
+</file>
+
+<file path=ppt/slides/slide11.xml><?xml version="1.0" encoding="utf-8"?>
+<p:sld xmlns:a="http://schemas.openxmlformats.org/drawingml/2006/main" xmlns:r="http://schemas.openxmlformats.org/officeDocument/2006/relationships" xmlns:p="http://schemas.openxmlformats.org/presentationml/2006/main">
+  <p:cSld>
+    <p:spTree>
+      <p:nvGrpSpPr>
+        <p:cNvPr id="1" name=""/>
+        <p:cNvGrpSpPr/>
+        <p:nvPr/>
+      </p:nvGrpSpPr>
+      <p:grpSpPr>
+        <a:xfrm>
+          <a:off x="0" y="0"/>
+          <a:ext cx="0" cy="0"/>
+          <a:chOff x="0" y="0"/>
+          <a:chExt cx="0" cy="0"/>
+        </a:xfrm>
+      </p:grpSpPr>
+      <p:sp>
+        <p:nvSpPr>
+          <p:cNvPr id="5" name="Titel 4"/>
+          <p:cNvSpPr>
+            <a:spLocks noGrp="1"/>
+          </p:cNvSpPr>
+          <p:nvPr>
+            <p:ph type="ctrTitle"/>
+          </p:nvPr>
+        </p:nvSpPr>
+        <p:spPr/>
+        <p:txBody>
+          <a:bodyPr/>
+          <a:lstStyle/>
+          <a:p>
+            <a:r>
+              <a:rPr lang="en-US" dirty="0"/>
+              <a:t>Thank you for your time – any open questions?</a:t>
+            </a:r>
+            <a:endParaRPr lang="de-DE" dirty="0"/>
+          </a:p>
+        </p:txBody>
+      </p:sp>
+      <p:sp>
+        <p:nvSpPr>
+          <p:cNvPr id="6" name="Untertitel 5"/>
+          <p:cNvSpPr>
+            <a:spLocks noGrp="1"/>
+          </p:cNvSpPr>
+          <p:nvPr>
+            <p:ph type="subTitle" idx="1"/>
+          </p:nvPr>
+        </p:nvSpPr>
+        <p:spPr>
+          <a:xfrm>
+            <a:off x="485776" y="2522886"/>
+            <a:ext cx="11218862" cy="430887"/>
+          </a:xfrm>
+        </p:spPr>
+        <p:txBody>
+          <a:bodyPr/>
+          <a:lstStyle/>
+          <a:p>
+            <a:r>
+              <a:rPr lang="de-DE" dirty="0" err="1"/>
+              <a:t>Predictive</a:t>
+            </a:r>
+            <a:r>
+              <a:rPr lang="de-DE" dirty="0"/>
+              <a:t> Maintenance - Always </a:t>
+            </a:r>
+            <a:r>
+              <a:rPr lang="de-DE" dirty="0" err="1"/>
+              <a:t>one</a:t>
+            </a:r>
+            <a:r>
+              <a:rPr lang="de-DE" dirty="0"/>
+              <a:t> </a:t>
+            </a:r>
+            <a:r>
+              <a:rPr lang="de-DE" dirty="0" err="1"/>
+              <a:t>step</a:t>
+            </a:r>
+            <a:r>
+              <a:rPr lang="de-DE" dirty="0"/>
+              <a:t> </a:t>
+            </a:r>
+            <a:r>
+              <a:rPr lang="de-DE" dirty="0" err="1"/>
+              <a:t>ahead</a:t>
+            </a:r>
+            <a:r>
+              <a:rPr lang="de-DE" dirty="0"/>
+              <a:t> </a:t>
+            </a:r>
+            <a:r>
+              <a:rPr lang="de-DE" dirty="0" err="1"/>
+              <a:t>of</a:t>
+            </a:r>
+            <a:r>
+              <a:rPr lang="de-DE" dirty="0"/>
+              <a:t> </a:t>
+            </a:r>
+            <a:r>
+              <a:rPr lang="de-DE" dirty="0" err="1"/>
+              <a:t>failure</a:t>
+            </a:r>
+            <a:r>
+              <a:rPr lang="de-DE" dirty="0"/>
+              <a:t> </a:t>
+            </a:r>
+            <a:r>
+              <a:rPr lang="de-DE" dirty="0" err="1"/>
+              <a:t>with</a:t>
+            </a:r>
+            <a:r>
+              <a:rPr lang="de-DE" dirty="0"/>
+              <a:t> AI</a:t>
+            </a:r>
+          </a:p>
+        </p:txBody>
+      </p:sp>
+      <p:sp>
+        <p:nvSpPr>
+          <p:cNvPr id="7" name="Textplatzhalter 6"/>
+          <p:cNvSpPr>
+            <a:spLocks noGrp="1"/>
+          </p:cNvSpPr>
+          <p:nvPr>
+            <p:ph type="body" sz="quarter" idx="10"/>
+          </p:nvPr>
+        </p:nvSpPr>
+        <p:spPr>
+          <a:xfrm>
+            <a:off x="485776" y="6060692"/>
+            <a:ext cx="11218862" cy="246221"/>
+          </a:xfrm>
+        </p:spPr>
+        <p:txBody>
+          <a:bodyPr/>
+          <a:lstStyle/>
+          <a:p>
+            <a:r>
+              <a:rPr lang="de-DE" dirty="0"/>
+              <a:t>Hamburg, 2021</a:t>
+            </a:r>
+          </a:p>
+        </p:txBody>
+      </p:sp>
+    </p:spTree>
+    <p:extLst>
+      <p:ext uri="{BB962C8B-B14F-4D97-AF65-F5344CB8AC3E}">
+        <p14:creationId xmlns:p14="http://schemas.microsoft.com/office/powerpoint/2010/main" val="328586767"/>
+      </p:ext>
+    </p:extLst>
+  </p:cSld>
+  <p:clrMapOvr>
+    <a:masterClrMapping/>
+  </p:clrMapOvr>
+</p:sld>
+</file>
+
 <file path=ppt/slides/slide2.xml><?xml version="1.0" encoding="utf-8"?>
+<p:sld xmlns:a="http://schemas.openxmlformats.org/drawingml/2006/main" xmlns:r="http://schemas.openxmlformats.org/officeDocument/2006/relationships" xmlns:p="http://schemas.openxmlformats.org/presentationml/2006/main">
+  <p:cSld>
+    <p:spTree>
+      <p:nvGrpSpPr>
+        <p:cNvPr id="1" name=""/>
+        <p:cNvGrpSpPr/>
+        <p:nvPr/>
+      </p:nvGrpSpPr>
+      <p:grpSpPr>
+        <a:xfrm>
+          <a:off x="0" y="0"/>
+          <a:ext cx="0" cy="0"/>
+          <a:chOff x="0" y="0"/>
+          <a:chExt cx="0" cy="0"/>
+        </a:xfrm>
+      </p:grpSpPr>
+      <p:sp>
+        <p:nvSpPr>
+          <p:cNvPr id="2" name="Title 1">
+            <a:extLst>
+              <a:ext uri="{FF2B5EF4-FFF2-40B4-BE49-F238E27FC236}">
+                <a16:creationId xmlns:a16="http://schemas.microsoft.com/office/drawing/2014/main" id="{604F227C-BFC8-48AC-AAE0-D45FFFF11A9F}"/>
+              </a:ext>
+            </a:extLst>
+          </p:cNvPr>
+          <p:cNvSpPr txBox="1">
+            <a:spLocks/>
+          </p:cNvSpPr>
+          <p:nvPr/>
+        </p:nvSpPr>
+        <p:spPr>
+          <a:xfrm>
+            <a:off x="485775" y="1641599"/>
+            <a:ext cx="11220450" cy="332399"/>
+          </a:xfrm>
+          <a:prstGeom prst="rect">
+            <a:avLst/>
+          </a:prstGeom>
+        </p:spPr>
+        <p:txBody>
+          <a:bodyPr/>
+          <a:lstStyle>
+            <a:lvl1pPr algn="l" defTabSz="914400" rtl="0" eaLnBrk="1" latinLnBrk="0" hangingPunct="1">
+              <a:lnSpc>
+                <a:spcPct val="90000"/>
+              </a:lnSpc>
+              <a:spcBef>
+                <a:spcPct val="0"/>
+              </a:spcBef>
+              <a:buNone/>
+              <a:defRPr sz="2400" kern="1200">
+                <a:solidFill>
+                  <a:schemeClr val="tx2"/>
+                </a:solidFill>
+                <a:latin typeface="+mj-lt"/>
+                <a:ea typeface="+mj-ea"/>
+                <a:cs typeface="+mj-cs"/>
+              </a:defRPr>
+            </a:lvl1pPr>
+          </a:lstStyle>
+          <a:p>
+            <a:r>
+              <a:rPr lang="de-DE" b="1" dirty="0"/>
+              <a:t>Agenda</a:t>
+            </a:r>
+          </a:p>
+        </p:txBody>
+      </p:sp>
+    </p:spTree>
+    <p:extLst>
+      <p:ext uri="{BB962C8B-B14F-4D97-AF65-F5344CB8AC3E}">
+        <p14:creationId xmlns:p14="http://schemas.microsoft.com/office/powerpoint/2010/main" val="2640997171"/>
+      </p:ext>
+    </p:extLst>
+  </p:cSld>
+  <p:clrMapOvr>
+    <a:masterClrMapping/>
+  </p:clrMapOvr>
+</p:sld>
+</file>
+
+<file path=ppt/slides/slide3.xml><?xml version="1.0" encoding="utf-8"?>
 <p:sld xmlns:a="http://schemas.openxmlformats.org/drawingml/2006/main" xmlns:r="http://schemas.openxmlformats.org/officeDocument/2006/relationships" xmlns:p="http://schemas.openxmlformats.org/presentationml/2006/main">
   <p:cSld>
     <p:spTree>
@@ -12915,61 +14456,26 @@
           <a:lstStyle/>
           <a:p>
             <a:r>
-              <a:rPr lang="de-DE" dirty="0" err="1"/>
-              <a:t>Predictive</a:t>
-            </a:r>
-            <a:r>
-              <a:rPr lang="de-DE" dirty="0"/>
-              <a:t> Maintenance – </a:t>
-            </a:r>
-            <a:r>
-              <a:rPr lang="de-DE" dirty="0" err="1"/>
-              <a:t>What</a:t>
-            </a:r>
-            <a:r>
-              <a:rPr lang="de-DE" dirty="0"/>
+              <a:rPr lang="de-DE" b="1" dirty="0" err="1"/>
+              <a:t>Introduction</a:t>
+            </a:r>
+            <a:r>
+              <a:rPr lang="de-DE" b="1" dirty="0"/>
               <a:t> </a:t>
             </a:r>
             <a:r>
-              <a:rPr lang="de-DE" dirty="0" err="1"/>
-              <a:t>does</a:t>
-            </a:r>
-            <a:r>
-              <a:rPr lang="de-DE" dirty="0"/>
-              <a:t> </a:t>
-            </a:r>
-            <a:r>
-              <a:rPr lang="de-DE" dirty="0" err="1"/>
-              <a:t>it</a:t>
-            </a:r>
-            <a:r>
-              <a:rPr lang="de-DE" dirty="0"/>
-              <a:t> </a:t>
-            </a:r>
-            <a:r>
-              <a:rPr lang="de-DE" dirty="0" err="1"/>
-              <a:t>offer</a:t>
-            </a:r>
-            <a:r>
-              <a:rPr lang="de-DE" dirty="0"/>
-              <a:t> </a:t>
-            </a:r>
-            <a:r>
-              <a:rPr lang="de-DE" dirty="0" err="1"/>
-              <a:t>to</a:t>
-            </a:r>
-            <a:r>
-              <a:rPr lang="de-DE" dirty="0"/>
-              <a:t> </a:t>
-            </a:r>
-            <a:r>
-              <a:rPr lang="de-DE" dirty="0" err="1"/>
-              <a:t>you</a:t>
-            </a:r>
-            <a:r>
-              <a:rPr lang="de-DE" dirty="0"/>
-              <a:t>?</a:t>
-            </a:r>
+              <a:rPr lang="de-DE" b="1" dirty="0" err="1"/>
+              <a:t>into</a:t>
+            </a:r>
+            <a:r>
+              <a:rPr lang="de-DE" b="1" dirty="0"/>
+              <a:t> Maintenance </a:t>
+            </a:r>
+            <a:r>
+              <a:rPr lang="de-DE" b="1" dirty="0" err="1"/>
+              <a:t>Approaches</a:t>
+            </a:r>
+            <a:endParaRPr lang="de-DE" b="1" dirty="0"/>
           </a:p>
         </p:txBody>
       </p:sp>
@@ -13006,15 +14512,15 @@
               <a:buChar char="•"/>
             </a:pPr>
             <a:r>
-              <a:rPr lang="en-US" sz="1800" dirty="0"/>
-              <a:t>Predicting Failures before they happen by using machine learning models </a:t>
+              <a:rPr lang="en-US" sz="1800" b="1" dirty="0"/>
+              <a:t>Reactive Maintenance</a:t>
             </a:r>
             <a:br>
               <a:rPr lang="en-US" sz="1800" dirty="0"/>
             </a:br>
             <a:r>
               <a:rPr lang="en-US" sz="1800" dirty="0"/>
-              <a:t>for pattern identification in your sensory data	</a:t>
+              <a:t>Waiting for something to fail in order to repair it.</a:t>
             </a:r>
           </a:p>
           <a:p>
@@ -13030,29 +14536,15 @@
               <a:buChar char="•"/>
             </a:pPr>
             <a:r>
-              <a:rPr lang="en-US" sz="1800" dirty="0"/>
-              <a:t>Enhanced Trust in the reliability of your machines</a:t>
-            </a:r>
-          </a:p>
-          <a:p>
-            <a:pPr lvl="1"/>
-            <a:endParaRPr lang="en-US" sz="1800" dirty="0"/>
-          </a:p>
-          <a:p>
-            <a:pPr lvl="1">
-              <a:buFont typeface="Arial" panose="020B0604020202020204" pitchFamily="34" charset="0"/>
-              <a:buChar char="•"/>
-            </a:pPr>
-            <a:r>
-              <a:rPr lang="en-US" sz="1800" dirty="0"/>
-              <a:t>Minimization of maintenance cost by combining the cost of maintenance and failing machines </a:t>
+              <a:rPr lang="en-US" sz="1800" b="1" dirty="0"/>
+              <a:t>Preventive Maintenance</a:t>
             </a:r>
             <a:br>
               <a:rPr lang="en-US" sz="1800" dirty="0"/>
             </a:br>
             <a:r>
               <a:rPr lang="en-US" sz="1800" dirty="0"/>
-              <a:t>with the predictions of our machine learning models</a:t>
+              <a:t>Relying on average or expected life statistics.</a:t>
             </a:r>
           </a:p>
           <a:p>
@@ -13068,16 +14560,16 @@
               <a:buChar char="•"/>
             </a:pPr>
             <a:r>
+              <a:rPr lang="en-US" sz="1800" b="1" dirty="0"/>
+              <a:t>Predictive Maintenance</a:t>
+            </a:r>
+            <a:br>
               <a:rPr lang="en-US" sz="1800" dirty="0"/>
-              <a:t>Confidence in knowing you are not missing out on the advantages of state-of-the-art AI technologies</a:t>
-            </a:r>
-          </a:p>
-          <a:p>
-            <a:pPr lvl="1">
-              <a:buFont typeface="Arial" panose="020B0604020202020204" pitchFamily="34" charset="0"/>
-              <a:buChar char="•"/>
-            </a:pPr>
-            <a:endParaRPr lang="en-US" sz="1800" dirty="0"/>
+            </a:br>
+            <a:r>
+              <a:rPr lang="en-US" sz="1800" dirty="0"/>
+              <a:t>Relying on the actual condition of equipment (e.g., measured through sensors) by using ML approaches to diagnose the health of the system and forecast its future states.</a:t>
+            </a:r>
           </a:p>
         </p:txBody>
       </p:sp>
@@ -13169,6 +14661,286 @@
     </p:spTree>
     <p:extLst>
       <p:ext uri="{BB962C8B-B14F-4D97-AF65-F5344CB8AC3E}">
+        <p14:creationId xmlns:p14="http://schemas.microsoft.com/office/powerpoint/2010/main" val="1168465600"/>
+      </p:ext>
+    </p:extLst>
+  </p:cSld>
+  <p:clrMapOvr>
+    <a:masterClrMapping/>
+  </p:clrMapOvr>
+</p:sld>
+</file>
+
+<file path=ppt/slides/slide4.xml><?xml version="1.0" encoding="utf-8"?>
+<p:sld xmlns:a="http://schemas.openxmlformats.org/drawingml/2006/main" xmlns:r="http://schemas.openxmlformats.org/officeDocument/2006/relationships" xmlns:p="http://schemas.openxmlformats.org/presentationml/2006/main">
+  <p:cSld>
+    <p:spTree>
+      <p:nvGrpSpPr>
+        <p:cNvPr id="1" name=""/>
+        <p:cNvGrpSpPr/>
+        <p:nvPr/>
+      </p:nvGrpSpPr>
+      <p:grpSpPr>
+        <a:xfrm>
+          <a:off x="0" y="0"/>
+          <a:ext cx="0" cy="0"/>
+          <a:chOff x="0" y="0"/>
+          <a:chExt cx="0" cy="0"/>
+        </a:xfrm>
+      </p:grpSpPr>
+      <p:sp>
+        <p:nvSpPr>
+          <p:cNvPr id="2" name="Title 1">
+            <a:extLst>
+              <a:ext uri="{FF2B5EF4-FFF2-40B4-BE49-F238E27FC236}">
+                <a16:creationId xmlns:a16="http://schemas.microsoft.com/office/drawing/2014/main" id="{B34A043A-093E-4A08-9597-D149A6E48749}"/>
+              </a:ext>
+            </a:extLst>
+          </p:cNvPr>
+          <p:cNvSpPr>
+            <a:spLocks noGrp="1"/>
+          </p:cNvSpPr>
+          <p:nvPr>
+            <p:ph type="title"/>
+          </p:nvPr>
+        </p:nvSpPr>
+        <p:spPr>
+          <a:xfrm>
+            <a:off x="485775" y="597844"/>
+            <a:ext cx="11220450" cy="332399"/>
+          </a:xfrm>
+        </p:spPr>
+        <p:txBody>
+          <a:bodyPr/>
+          <a:lstStyle/>
+          <a:p>
+            <a:r>
+              <a:rPr lang="de-DE" b="1" dirty="0" err="1"/>
+              <a:t>Why</a:t>
+            </a:r>
+            <a:r>
+              <a:rPr lang="de-DE" b="1" dirty="0"/>
+              <a:t> </a:t>
+            </a:r>
+            <a:r>
+              <a:rPr lang="de-DE" b="1" dirty="0" err="1"/>
+              <a:t>Predictive</a:t>
+            </a:r>
+            <a:r>
+              <a:rPr lang="de-DE" b="1" dirty="0"/>
+              <a:t> Maintenance will </a:t>
+            </a:r>
+            <a:r>
+              <a:rPr lang="de-DE" b="1" dirty="0" err="1"/>
+              <a:t>benefit</a:t>
+            </a:r>
+            <a:r>
+              <a:rPr lang="de-DE" b="1" dirty="0"/>
+              <a:t> </a:t>
+            </a:r>
+            <a:r>
+              <a:rPr lang="de-DE" b="1" dirty="0" err="1"/>
+              <a:t>you</a:t>
+            </a:r>
+            <a:endParaRPr lang="de-DE" b="1" dirty="0"/>
+          </a:p>
+        </p:txBody>
+      </p:sp>
+      <p:sp>
+        <p:nvSpPr>
+          <p:cNvPr id="3" name="Content Placeholder 2">
+            <a:extLst>
+              <a:ext uri="{FF2B5EF4-FFF2-40B4-BE49-F238E27FC236}">
+                <a16:creationId xmlns:a16="http://schemas.microsoft.com/office/drawing/2014/main" id="{A96DFF02-2765-42C3-A1C1-99E3FB709705}"/>
+              </a:ext>
+            </a:extLst>
+          </p:cNvPr>
+          <p:cNvSpPr>
+            <a:spLocks noGrp="1"/>
+          </p:cNvSpPr>
+          <p:nvPr>
+            <p:ph idx="1"/>
+          </p:nvPr>
+        </p:nvSpPr>
+        <p:spPr>
+          <a:xfrm>
+            <a:off x="481012" y="1680504"/>
+            <a:ext cx="11225213" cy="4538663"/>
+          </a:xfrm>
+        </p:spPr>
+        <p:txBody>
+          <a:bodyPr>
+            <a:normAutofit/>
+          </a:bodyPr>
+          <a:lstStyle/>
+          <a:p>
+            <a:pPr lvl="1">
+              <a:buFont typeface="Arial" panose="020B0604020202020204" pitchFamily="34" charset="0"/>
+              <a:buChar char="•"/>
+            </a:pPr>
+            <a:r>
+              <a:rPr lang="en-US" sz="1800" b="1" dirty="0"/>
+              <a:t>Saved Money</a:t>
+            </a:r>
+          </a:p>
+          <a:p>
+            <a:pPr lvl="2">
+              <a:buFont typeface="Arial" panose="020B0604020202020204" pitchFamily="34" charset="0"/>
+              <a:buChar char="•"/>
+            </a:pPr>
+            <a:r>
+              <a:rPr lang="en-US" sz="1800" dirty="0"/>
+              <a:t>Minimization of maintenance cost by combining the cost of maintenance and machine failures </a:t>
+            </a:r>
+            <a:br>
+              <a:rPr lang="en-US" sz="1800" dirty="0"/>
+            </a:br>
+            <a:r>
+              <a:rPr lang="en-US" sz="1800" dirty="0"/>
+              <a:t>with the predictions of our machine learning models</a:t>
+            </a:r>
+            <a:endParaRPr lang="en-US" sz="1800" b="1" dirty="0"/>
+          </a:p>
+          <a:p>
+            <a:pPr marL="180000" lvl="1" indent="0">
+              <a:buNone/>
+            </a:pPr>
+            <a:endParaRPr lang="en-US" sz="1800" b="1" dirty="0"/>
+          </a:p>
+          <a:p>
+            <a:pPr lvl="1">
+              <a:buFont typeface="Arial" panose="020B0604020202020204" pitchFamily="34" charset="0"/>
+              <a:buChar char="•"/>
+            </a:pPr>
+            <a:r>
+              <a:rPr lang="en-US" sz="1800" b="1" dirty="0"/>
+              <a:t>Enhanced Trust </a:t>
+            </a:r>
+            <a:r>
+              <a:rPr lang="en-US" sz="1800" dirty="0"/>
+              <a:t>in the reliability of your machines</a:t>
+            </a:r>
+          </a:p>
+          <a:p>
+            <a:pPr lvl="2">
+              <a:buFont typeface="Arial" panose="020B0604020202020204" pitchFamily="34" charset="0"/>
+              <a:buChar char="•"/>
+            </a:pPr>
+            <a:r>
+              <a:rPr lang="en-US" sz="1800" dirty="0"/>
+              <a:t>You will predict failures before they happen by using machine learning models for pattern identification in your sensory data	</a:t>
+            </a:r>
+          </a:p>
+          <a:p>
+            <a:pPr marL="180000" lvl="1" indent="0">
+              <a:buNone/>
+            </a:pPr>
+            <a:endParaRPr lang="en-US" sz="1800" dirty="0"/>
+          </a:p>
+          <a:p>
+            <a:pPr lvl="1">
+              <a:buFont typeface="Arial" panose="020B0604020202020204" pitchFamily="34" charset="0"/>
+              <a:buChar char="•"/>
+            </a:pPr>
+            <a:r>
+              <a:rPr lang="en-US" sz="1800" b="1" dirty="0"/>
+              <a:t>Confidence</a:t>
+            </a:r>
+            <a:r>
+              <a:rPr lang="en-US" sz="1800" dirty="0"/>
+              <a:t> in knowing you are not missing out on the advantages of state-of-the-art AI technologies</a:t>
+            </a:r>
+          </a:p>
+        </p:txBody>
+      </p:sp>
+      <p:sp>
+        <p:nvSpPr>
+          <p:cNvPr id="4" name="Text Placeholder 3">
+            <a:extLst>
+              <a:ext uri="{FF2B5EF4-FFF2-40B4-BE49-F238E27FC236}">
+                <a16:creationId xmlns:a16="http://schemas.microsoft.com/office/drawing/2014/main" id="{535CEAC9-471F-49AB-827D-087FBA79C58E}"/>
+              </a:ext>
+            </a:extLst>
+          </p:cNvPr>
+          <p:cNvSpPr>
+            <a:spLocks noGrp="1"/>
+          </p:cNvSpPr>
+          <p:nvPr>
+            <p:ph type="body" sz="quarter" idx="10"/>
+          </p:nvPr>
+        </p:nvSpPr>
+        <p:spPr>
+          <a:xfrm>
+            <a:off x="485775" y="268697"/>
+            <a:ext cx="10096500" cy="246221"/>
+          </a:xfrm>
+        </p:spPr>
+        <p:txBody>
+          <a:bodyPr/>
+          <a:lstStyle/>
+          <a:p>
+            <a:r>
+              <a:rPr lang="de-DE" dirty="0" err="1"/>
+              <a:t>Predictive</a:t>
+            </a:r>
+            <a:r>
+              <a:rPr lang="de-DE" dirty="0"/>
+              <a:t> Maintenance - Always </a:t>
+            </a:r>
+            <a:r>
+              <a:rPr lang="de-DE" dirty="0" err="1"/>
+              <a:t>one</a:t>
+            </a:r>
+            <a:r>
+              <a:rPr lang="de-DE" dirty="0"/>
+              <a:t> </a:t>
+            </a:r>
+            <a:r>
+              <a:rPr lang="de-DE" dirty="0" err="1"/>
+              <a:t>step</a:t>
+            </a:r>
+            <a:r>
+              <a:rPr lang="de-DE" dirty="0"/>
+              <a:t> </a:t>
+            </a:r>
+            <a:r>
+              <a:rPr lang="de-DE" dirty="0" err="1"/>
+              <a:t>ahead</a:t>
+            </a:r>
+            <a:r>
+              <a:rPr lang="de-DE" dirty="0"/>
+              <a:t> </a:t>
+            </a:r>
+            <a:r>
+              <a:rPr lang="de-DE" dirty="0" err="1"/>
+              <a:t>of</a:t>
+            </a:r>
+            <a:r>
+              <a:rPr lang="de-DE" dirty="0"/>
+              <a:t> </a:t>
+            </a:r>
+            <a:r>
+              <a:rPr lang="de-DE" dirty="0" err="1"/>
+              <a:t>failure</a:t>
+            </a:r>
+            <a:r>
+              <a:rPr lang="de-DE" dirty="0"/>
+              <a:t> </a:t>
+            </a:r>
+            <a:r>
+              <a:rPr lang="de-DE" dirty="0" err="1"/>
+              <a:t>with</a:t>
+            </a:r>
+            <a:r>
+              <a:rPr lang="de-DE" dirty="0"/>
+              <a:t> AI</a:t>
+            </a:r>
+          </a:p>
+        </p:txBody>
+      </p:sp>
+    </p:spTree>
+    <p:extLst>
+      <p:ext uri="{BB962C8B-B14F-4D97-AF65-F5344CB8AC3E}">
         <p14:creationId xmlns:p14="http://schemas.microsoft.com/office/powerpoint/2010/main" val="139977123"/>
       </p:ext>
     </p:extLst>
@@ -13179,7 +14951,7 @@
 </p:sld>
 </file>
 
-<file path=ppt/slides/slide3.xml><?xml version="1.0" encoding="utf-8"?>
+<file path=ppt/slides/slide5.xml><?xml version="1.0" encoding="utf-8"?>
 <p:sld xmlns:a="http://schemas.openxmlformats.org/drawingml/2006/main" xmlns:r="http://schemas.openxmlformats.org/officeDocument/2006/relationships" xmlns:p="http://schemas.openxmlformats.org/presentationml/2006/main">
   <p:cSld>
     <p:spTree>
@@ -13215,13 +14987,20 @@
         <p:spPr>
           <a:xfrm>
             <a:off x="485775" y="597844"/>
-            <a:ext cx="11220450" cy="332399"/>
+            <a:ext cx="11220450" cy="664797"/>
           </a:xfrm>
         </p:spPr>
         <p:txBody>
           <a:bodyPr/>
           <a:lstStyle/>
           <a:p>
+            <a:r>
+              <a:rPr lang="en-US" sz="2400" b="1" dirty="0"/>
+              <a:t>The Predictive Power in your Data</a:t>
+            </a:r>
+            <a:br>
+              <a:rPr lang="en-US" sz="2400" dirty="0"/>
+            </a:br>
             <a:r>
               <a:rPr lang="de-DE" dirty="0" err="1"/>
               <a:t>Our</a:t>
@@ -13274,28 +15053,40 @@
           <a:p>
             <a:r>
               <a:rPr lang="en-US" sz="1800" dirty="0"/>
-              <a:t>The Data is labeled:</a:t>
+              <a:t>The data is labeled:</a:t>
             </a:r>
           </a:p>
           <a:p>
             <a:pPr lvl="1"/>
             <a:r>
+              <a:rPr lang="en-US" sz="1800" b="1" dirty="0"/>
+              <a:t>Normal</a:t>
+            </a:r>
+            <a:r>
               <a:rPr lang="en-US" sz="1800" dirty="0"/>
-              <a:t>Normal, the machine is working properly</a:t>
+              <a:t>, the machine is working properly</a:t>
             </a:r>
           </a:p>
           <a:p>
             <a:pPr lvl="1"/>
             <a:r>
+              <a:rPr lang="en-US" sz="1800" b="1" dirty="0"/>
+              <a:t>Recovering</a:t>
+            </a:r>
+            <a:r>
               <a:rPr lang="en-US" sz="1800" dirty="0"/>
-              <a:t>Recovering, the machine‘s status after a failure</a:t>
+              <a:t>, the machine‘s status after a failure</a:t>
             </a:r>
           </a:p>
           <a:p>
             <a:pPr lvl="1"/>
             <a:r>
+              <a:rPr lang="en-US" sz="1800" b="1" dirty="0"/>
+              <a:t>Broken</a:t>
+            </a:r>
+            <a:r>
               <a:rPr lang="en-US" sz="1800" dirty="0"/>
-              <a:t>Broken, the machine failed</a:t>
+              <a:t>, the machine failed</a:t>
             </a:r>
           </a:p>
           <a:p>
@@ -13311,12 +15102,12 @@
           <a:p>
             <a:pPr lvl="1"/>
             <a:r>
+              <a:rPr lang="en-US" sz="1800" b="1" dirty="0"/>
+              <a:t>Danger</a:t>
+            </a:r>
+            <a:r>
               <a:rPr lang="en-US" sz="1800" dirty="0"/>
-              <a:t>Danger, the X minutes before a machine </a:t>
-            </a:r>
-            <a:r>
-              <a:rPr lang="en-US" sz="1800" dirty="0" err="1"/>
-              <a:t>failes</a:t>
+              <a:t>, the X minutes before a machine fails</a:t>
             </a:r>
             <a:br>
               <a:rPr lang="en-US" sz="1800" dirty="0"/>
@@ -13350,7 +15141,7 @@
           <a:p>
             <a:r>
               <a:rPr lang="en-US" sz="1800" dirty="0"/>
-              <a:t>Our window: 4 days (5760 minutes)</a:t>
+              <a:t>Our window for this example: 4 days (5760 minutes)</a:t>
             </a:r>
           </a:p>
         </p:txBody>
@@ -13453,7 +15244,7 @@
 </p:sld>
 </file>
 
-<file path=ppt/slides/slide4.xml><?xml version="1.0" encoding="utf-8"?>
+<file path=ppt/slides/slide6.xml><?xml version="1.0" encoding="utf-8"?>
 <p:sld xmlns:a="http://schemas.openxmlformats.org/drawingml/2006/main" xmlns:r="http://schemas.openxmlformats.org/officeDocument/2006/relationships" xmlns:p="http://schemas.openxmlformats.org/presentationml/2006/main">
   <p:cSld>
     <p:spTree>
@@ -13497,9 +15288,10 @@
           <a:lstStyle/>
           <a:p>
             <a:r>
-              <a:rPr lang="en-US" dirty="0"/>
-              <a:t>Our Approach – Predicting </a:t>
-            </a:r>
+              <a:rPr lang="en-US" sz="2400" b="1" dirty="0"/>
+              <a:t>The Predictive Power in your Data</a:t>
+            </a:r>
+            <a:endParaRPr lang="en-US" dirty="0"/>
           </a:p>
         </p:txBody>
       </p:sp>
@@ -13525,8 +15317,60 @@
           <a:lstStyle/>
           <a:p>
             <a:r>
-              <a:rPr lang="en-US"/>
-              <a:t>Integrating danger windows into the data</a:t>
+              <a:rPr lang="de-DE" dirty="0" err="1"/>
+              <a:t>Predictive</a:t>
+            </a:r>
+            <a:r>
+              <a:rPr lang="de-DE" dirty="0"/>
+              <a:t> Maintenance - Always </a:t>
+            </a:r>
+            <a:r>
+              <a:rPr lang="de-DE" dirty="0" err="1"/>
+              <a:t>one</a:t>
+            </a:r>
+            <a:r>
+              <a:rPr lang="de-DE" dirty="0"/>
+              <a:t> </a:t>
+            </a:r>
+            <a:r>
+              <a:rPr lang="de-DE" dirty="0" err="1"/>
+              <a:t>step</a:t>
+            </a:r>
+            <a:r>
+              <a:rPr lang="de-DE" dirty="0"/>
+              <a:t> </a:t>
+            </a:r>
+            <a:r>
+              <a:rPr lang="de-DE" dirty="0" err="1"/>
+              <a:t>ahead</a:t>
+            </a:r>
+            <a:r>
+              <a:rPr lang="de-DE" dirty="0"/>
+              <a:t> </a:t>
+            </a:r>
+            <a:r>
+              <a:rPr lang="de-DE" dirty="0" err="1"/>
+              <a:t>of</a:t>
+            </a:r>
+            <a:r>
+              <a:rPr lang="de-DE" dirty="0"/>
+              <a:t> </a:t>
+            </a:r>
+            <a:r>
+              <a:rPr lang="de-DE" dirty="0" err="1"/>
+              <a:t>failure</a:t>
+            </a:r>
+            <a:r>
+              <a:rPr lang="de-DE" dirty="0"/>
+              <a:t> </a:t>
+            </a:r>
+            <a:r>
+              <a:rPr lang="de-DE" dirty="0" err="1"/>
+              <a:t>with</a:t>
+            </a:r>
+            <a:r>
+              <a:rPr lang="de-DE" dirty="0"/>
+              <a:t> AI</a:t>
             </a:r>
           </a:p>
         </p:txBody>
@@ -13650,7 +15494,7 @@
           <a:lstStyle/>
           <a:p>
             <a:r>
-              <a:rPr lang="en-US" sz="1400" dirty="0"/>
+              <a:rPr lang="en-US" sz="1400" b="1" dirty="0"/>
               <a:t>Normal – Green      Recovering – Yellow      Danger – Red      Failure – Vertical Line</a:t>
             </a:r>
           </a:p>
@@ -13710,7 +15554,7 @@
 </p:sld>
 </file>
 
-<file path=ppt/slides/slide5.xml><?xml version="1.0" encoding="utf-8"?>
+<file path=ppt/slides/slide7.xml><?xml version="1.0" encoding="utf-8"?>
 <p:sld xmlns:a="http://schemas.openxmlformats.org/drawingml/2006/main" xmlns:r="http://schemas.openxmlformats.org/officeDocument/2006/relationships" xmlns:p="http://schemas.openxmlformats.org/presentationml/2006/main">
   <p:cSld>
     <p:spTree>
@@ -13754,415 +15598,10 @@
           <a:lstStyle/>
           <a:p>
             <a:r>
-              <a:rPr lang="de-DE" dirty="0"/>
-              <a:t>Splitting </a:t>
-            </a:r>
-            <a:r>
-              <a:rPr lang="de-DE" dirty="0" err="1"/>
-              <a:t>the</a:t>
-            </a:r>
-            <a:r>
-              <a:rPr lang="de-DE" dirty="0"/>
-              <a:t> Data</a:t>
-            </a:r>
-          </a:p>
-        </p:txBody>
-      </p:sp>
-      <p:sp>
-        <p:nvSpPr>
-          <p:cNvPr id="3" name="Text Placeholder 2">
-            <a:extLst>
-              <a:ext uri="{FF2B5EF4-FFF2-40B4-BE49-F238E27FC236}">
-                <a16:creationId xmlns:a16="http://schemas.microsoft.com/office/drawing/2014/main" id="{F667CB80-31A5-4E65-B6CF-7A1118923DFE}"/>
-              </a:ext>
-            </a:extLst>
-          </p:cNvPr>
-          <p:cNvSpPr>
-            <a:spLocks noGrp="1"/>
-          </p:cNvSpPr>
-          <p:nvPr>
-            <p:ph type="body" sz="quarter" idx="10"/>
-          </p:nvPr>
-        </p:nvSpPr>
-        <p:spPr/>
-        <p:txBody>
-          <a:bodyPr/>
-          <a:lstStyle/>
-          <a:p>
-            <a:r>
-              <a:rPr lang="de-DE" dirty="0" err="1"/>
-              <a:t>Predictive</a:t>
-            </a:r>
-            <a:r>
-              <a:rPr lang="de-DE" dirty="0"/>
-              <a:t> Maintenance - Always </a:t>
-            </a:r>
-            <a:r>
-              <a:rPr lang="de-DE" dirty="0" err="1"/>
-              <a:t>one</a:t>
-            </a:r>
-            <a:r>
-              <a:rPr lang="de-DE" dirty="0"/>
-              <a:t> </a:t>
-            </a:r>
-            <a:r>
-              <a:rPr lang="de-DE" dirty="0" err="1"/>
-              <a:t>step</a:t>
-            </a:r>
-            <a:r>
-              <a:rPr lang="de-DE" dirty="0"/>
-              <a:t> </a:t>
-            </a:r>
-            <a:r>
-              <a:rPr lang="de-DE" dirty="0" err="1"/>
-              <a:t>ahead</a:t>
-            </a:r>
-            <a:r>
-              <a:rPr lang="de-DE" dirty="0"/>
-              <a:t> </a:t>
-            </a:r>
-            <a:r>
-              <a:rPr lang="de-DE" dirty="0" err="1"/>
-              <a:t>of</a:t>
-            </a:r>
-            <a:r>
-              <a:rPr lang="de-DE" dirty="0"/>
-              <a:t> </a:t>
-            </a:r>
-            <a:r>
-              <a:rPr lang="de-DE" dirty="0" err="1"/>
-              <a:t>failure</a:t>
-            </a:r>
-            <a:r>
-              <a:rPr lang="de-DE" dirty="0"/>
-              <a:t> </a:t>
-            </a:r>
-            <a:r>
-              <a:rPr lang="de-DE" dirty="0" err="1"/>
-              <a:t>with</a:t>
-            </a:r>
-            <a:r>
-              <a:rPr lang="de-DE" dirty="0"/>
-              <a:t> AI</a:t>
-            </a:r>
-          </a:p>
-        </p:txBody>
-      </p:sp>
-      <p:grpSp>
-        <p:nvGrpSpPr>
-          <p:cNvPr id="8" name="Group 7">
-            <a:extLst>
-              <a:ext uri="{FF2B5EF4-FFF2-40B4-BE49-F238E27FC236}">
-                <a16:creationId xmlns:a16="http://schemas.microsoft.com/office/drawing/2014/main" id="{018ED955-7F8A-4F91-8049-8652F4D047AA}"/>
-              </a:ext>
-            </a:extLst>
-          </p:cNvPr>
-          <p:cNvGrpSpPr/>
-          <p:nvPr/>
-        </p:nvGrpSpPr>
-        <p:grpSpPr>
-          <a:xfrm>
-            <a:off x="628073" y="2101808"/>
-            <a:ext cx="10935854" cy="1849678"/>
-            <a:chOff x="628073" y="2296498"/>
-            <a:chExt cx="10935854" cy="1849678"/>
-          </a:xfrm>
-        </p:grpSpPr>
-        <p:pic>
-          <p:nvPicPr>
-            <p:cNvPr id="4" name="Picture 3">
-              <a:extLst>
-                <a:ext uri="{FF2B5EF4-FFF2-40B4-BE49-F238E27FC236}">
-                  <a16:creationId xmlns:a16="http://schemas.microsoft.com/office/drawing/2014/main" id="{3B90D201-80FD-45DD-96BB-EEA505C775EB}"/>
-                </a:ext>
-              </a:extLst>
-            </p:cNvPr>
-            <p:cNvPicPr>
-              <a:picLocks noChangeAspect="1"/>
-            </p:cNvPicPr>
-            <p:nvPr/>
-          </p:nvPicPr>
-          <p:blipFill rotWithShape="1">
-            <a:blip r:embed="rId2"/>
-            <a:srcRect l="37613" r="9129"/>
-            <a:stretch/>
-          </p:blipFill>
-          <p:spPr>
-            <a:xfrm>
-              <a:off x="5070764" y="2711823"/>
-              <a:ext cx="6493163" cy="1434353"/>
-            </a:xfrm>
-            <a:prstGeom prst="rect">
-              <a:avLst/>
-            </a:prstGeom>
-          </p:spPr>
-        </p:pic>
-        <p:pic>
-          <p:nvPicPr>
-            <p:cNvPr id="5" name="Picture 4">
-              <a:extLst>
-                <a:ext uri="{FF2B5EF4-FFF2-40B4-BE49-F238E27FC236}">
-                  <a16:creationId xmlns:a16="http://schemas.microsoft.com/office/drawing/2014/main" id="{D7938FC7-F8ED-4670-B4DD-8411C92C959A}"/>
-                </a:ext>
-              </a:extLst>
-            </p:cNvPr>
-            <p:cNvPicPr>
-              <a:picLocks noChangeAspect="1"/>
-            </p:cNvPicPr>
-            <p:nvPr/>
-          </p:nvPicPr>
-          <p:blipFill rotWithShape="1">
-            <a:blip r:embed="rId2"/>
-            <a:srcRect l="8522" r="62463"/>
-            <a:stretch/>
-          </p:blipFill>
-          <p:spPr>
-            <a:xfrm>
-              <a:off x="628073" y="2711823"/>
-              <a:ext cx="3537528" cy="1434353"/>
-            </a:xfrm>
-            <a:prstGeom prst="rect">
-              <a:avLst/>
-            </a:prstGeom>
-          </p:spPr>
-        </p:pic>
-        <p:sp>
-          <p:nvSpPr>
-            <p:cNvPr id="6" name="TextBox 5">
-              <a:extLst>
-                <a:ext uri="{FF2B5EF4-FFF2-40B4-BE49-F238E27FC236}">
-                  <a16:creationId xmlns:a16="http://schemas.microsoft.com/office/drawing/2014/main" id="{6487599B-B4F9-4162-9D88-851603AFAF02}"/>
-                </a:ext>
-              </a:extLst>
-            </p:cNvPr>
-            <p:cNvSpPr txBox="1"/>
-            <p:nvPr/>
-          </p:nvSpPr>
-          <p:spPr bwMode="gray">
-            <a:xfrm>
-              <a:off x="1828800" y="2296498"/>
-              <a:ext cx="1136073" cy="276999"/>
-            </a:xfrm>
-            <a:prstGeom prst="rect">
-              <a:avLst/>
-            </a:prstGeom>
-            <a:noFill/>
-          </p:spPr>
-          <p:txBody>
-            <a:bodyPr wrap="square" lIns="0" tIns="0" rIns="0" bIns="0" rtlCol="0">
-              <a:spAutoFit/>
-            </a:bodyPr>
-            <a:lstStyle/>
-            <a:p>
-              <a:pPr algn="ctr"/>
-              <a:r>
-                <a:rPr lang="de-DE" dirty="0"/>
-                <a:t>Train-Set</a:t>
-              </a:r>
-              <a:endParaRPr lang="de-DE" sz="1400" dirty="0"/>
-            </a:p>
-          </p:txBody>
-        </p:sp>
-        <p:sp>
-          <p:nvSpPr>
-            <p:cNvPr id="7" name="TextBox 6">
-              <a:extLst>
-                <a:ext uri="{FF2B5EF4-FFF2-40B4-BE49-F238E27FC236}">
-                  <a16:creationId xmlns:a16="http://schemas.microsoft.com/office/drawing/2014/main" id="{85770EA8-A4EA-4215-9036-ED8A590D73EC}"/>
-                </a:ext>
-              </a:extLst>
-            </p:cNvPr>
-            <p:cNvSpPr txBox="1"/>
-            <p:nvPr/>
-          </p:nvSpPr>
-          <p:spPr bwMode="gray">
-            <a:xfrm>
-              <a:off x="7592290" y="2296498"/>
-              <a:ext cx="1136073" cy="276999"/>
-            </a:xfrm>
-            <a:prstGeom prst="rect">
-              <a:avLst/>
-            </a:prstGeom>
-            <a:noFill/>
-          </p:spPr>
-          <p:txBody>
-            <a:bodyPr wrap="square" lIns="0" tIns="0" rIns="0" bIns="0" rtlCol="0">
-              <a:spAutoFit/>
-            </a:bodyPr>
-            <a:lstStyle/>
-            <a:p>
-              <a:pPr algn="ctr"/>
-              <a:r>
-                <a:rPr lang="de-DE" dirty="0"/>
-                <a:t>Test-Set</a:t>
-              </a:r>
-            </a:p>
-          </p:txBody>
-        </p:sp>
-      </p:grpSp>
-      <p:sp>
-        <p:nvSpPr>
-          <p:cNvPr id="9" name="TextBox 8">
-            <a:extLst>
-              <a:ext uri="{FF2B5EF4-FFF2-40B4-BE49-F238E27FC236}">
-                <a16:creationId xmlns:a16="http://schemas.microsoft.com/office/drawing/2014/main" id="{9335B574-641F-46BC-8A88-EC8F309D0735}"/>
-              </a:ext>
-            </a:extLst>
-          </p:cNvPr>
-          <p:cNvSpPr txBox="1"/>
-          <p:nvPr/>
-        </p:nvSpPr>
-        <p:spPr bwMode="gray">
-          <a:xfrm>
-            <a:off x="1016000" y="4847101"/>
-            <a:ext cx="6576290" cy="230832"/>
-          </a:xfrm>
-          <a:prstGeom prst="rect">
-            <a:avLst/>
-          </a:prstGeom>
-          <a:noFill/>
-        </p:spPr>
-        <p:txBody>
-          <a:bodyPr wrap="square" lIns="0" tIns="0" rIns="0" bIns="0" rtlCol="0">
-            <a:spAutoFit/>
-          </a:bodyPr>
-          <a:lstStyle/>
-          <a:p>
-            <a:r>
-              <a:rPr lang="de-DE" sz="1500" dirty="0" err="1"/>
-              <a:t>Unusual</a:t>
-            </a:r>
-            <a:r>
-              <a:rPr lang="de-DE" sz="1500" dirty="0"/>
-              <a:t> Train-Test-Split </a:t>
-            </a:r>
-            <a:r>
-              <a:rPr lang="de-DE" sz="1500" dirty="0" err="1"/>
-              <a:t>to</a:t>
-            </a:r>
-            <a:r>
-              <a:rPr lang="de-DE" sz="1500" dirty="0"/>
-              <a:t> </a:t>
-            </a:r>
-            <a:r>
-              <a:rPr lang="de-DE" sz="1500" dirty="0" err="1"/>
-              <a:t>ensure</a:t>
-            </a:r>
-            <a:r>
-              <a:rPr lang="de-DE" sz="1500" dirty="0"/>
-              <a:t> </a:t>
-            </a:r>
-            <a:r>
-              <a:rPr lang="de-DE" sz="1500" dirty="0" err="1"/>
-              <a:t>the</a:t>
-            </a:r>
-            <a:r>
-              <a:rPr lang="de-DE" sz="1500" dirty="0"/>
-              <a:t> </a:t>
-            </a:r>
-            <a:r>
-              <a:rPr lang="de-DE" sz="1500" dirty="0" err="1"/>
-              <a:t>model</a:t>
-            </a:r>
-            <a:r>
-              <a:rPr lang="de-DE" sz="1500" dirty="0"/>
-              <a:t> </a:t>
-            </a:r>
-            <a:r>
-              <a:rPr lang="de-DE" sz="1500" dirty="0" err="1"/>
-              <a:t>performs</a:t>
-            </a:r>
-            <a:r>
-              <a:rPr lang="de-DE" sz="1500" dirty="0"/>
-              <a:t> </a:t>
-            </a:r>
-            <a:r>
-              <a:rPr lang="de-DE" sz="1500" dirty="0" err="1"/>
-              <a:t>decently</a:t>
-            </a:r>
-            <a:r>
-              <a:rPr lang="de-DE" sz="1500" dirty="0"/>
-              <a:t> on different </a:t>
-            </a:r>
-            <a:r>
-              <a:rPr lang="de-DE" sz="1500" dirty="0" err="1"/>
-              <a:t>failures</a:t>
-            </a:r>
-            <a:r>
-              <a:rPr lang="de-DE" sz="1500" dirty="0"/>
-              <a:t>.</a:t>
-            </a:r>
-          </a:p>
-        </p:txBody>
-      </p:sp>
-    </p:spTree>
-    <p:extLst>
-      <p:ext uri="{BB962C8B-B14F-4D97-AF65-F5344CB8AC3E}">
-        <p14:creationId xmlns:p14="http://schemas.microsoft.com/office/powerpoint/2010/main" val="4135000065"/>
-      </p:ext>
-    </p:extLst>
-  </p:cSld>
-  <p:clrMapOvr>
-    <a:masterClrMapping/>
-  </p:clrMapOvr>
-</p:sld>
-</file>
-
-<file path=ppt/slides/slide6.xml><?xml version="1.0" encoding="utf-8"?>
-<p:sld xmlns:a="http://schemas.openxmlformats.org/drawingml/2006/main" xmlns:r="http://schemas.openxmlformats.org/officeDocument/2006/relationships" xmlns:p="http://schemas.openxmlformats.org/presentationml/2006/main">
-  <p:cSld>
-    <p:spTree>
-      <p:nvGrpSpPr>
-        <p:cNvPr id="1" name=""/>
-        <p:cNvGrpSpPr/>
-        <p:nvPr/>
-      </p:nvGrpSpPr>
-      <p:grpSpPr>
-        <a:xfrm>
-          <a:off x="0" y="0"/>
-          <a:ext cx="0" cy="0"/>
-          <a:chOff x="0" y="0"/>
-          <a:chExt cx="0" cy="0"/>
-        </a:xfrm>
-      </p:grpSpPr>
-      <p:sp>
-        <p:nvSpPr>
-          <p:cNvPr id="2" name="Title 1">
-            <a:extLst>
-              <a:ext uri="{FF2B5EF4-FFF2-40B4-BE49-F238E27FC236}">
-                <a16:creationId xmlns:a16="http://schemas.microsoft.com/office/drawing/2014/main" id="{1E97381D-E082-4DB6-8DAA-0BE966960C26}"/>
-              </a:ext>
-            </a:extLst>
-          </p:cNvPr>
-          <p:cNvSpPr>
-            <a:spLocks noGrp="1"/>
-          </p:cNvSpPr>
-          <p:nvPr>
-            <p:ph type="title"/>
-          </p:nvPr>
-        </p:nvSpPr>
-        <p:spPr>
-          <a:xfrm>
-            <a:off x="485775" y="597844"/>
-            <a:ext cx="11220450" cy="332399"/>
-          </a:xfrm>
-        </p:spPr>
-        <p:txBody>
-          <a:bodyPr/>
-          <a:lstStyle/>
-          <a:p>
-            <a:r>
-              <a:rPr lang="de-DE" dirty="0"/>
-              <a:t>Best Performing </a:t>
-            </a:r>
-            <a:r>
-              <a:rPr lang="de-DE" dirty="0" err="1"/>
-              <a:t>Machine</a:t>
-            </a:r>
-            <a:r>
-              <a:rPr lang="de-DE" dirty="0"/>
-              <a:t> Learning Models</a:t>
-            </a:r>
+              <a:rPr lang="en-US" sz="2400" b="1" dirty="0"/>
+              <a:t>The Predictive Power in your Data</a:t>
+            </a:r>
+            <a:endParaRPr lang="de-DE" dirty="0"/>
           </a:p>
         </p:txBody>
       </p:sp>
@@ -15733,7 +17172,7 @@
 </p:sld>
 </file>
 
-<file path=ppt/slides/slide7.xml><?xml version="1.0" encoding="utf-8"?>
+<file path=ppt/slides/slide8.xml><?xml version="1.0" encoding="utf-8"?>
 <p:sld xmlns:a="http://schemas.openxmlformats.org/drawingml/2006/main" xmlns:r="http://schemas.openxmlformats.org/officeDocument/2006/relationships" xmlns:p="http://schemas.openxmlformats.org/presentationml/2006/main">
   <p:cSld>
     <p:spTree>
@@ -15769,13 +17208,20 @@
         <p:spPr>
           <a:xfrm>
             <a:off x="485775" y="597844"/>
-            <a:ext cx="11220450" cy="332399"/>
+            <a:ext cx="11220450" cy="664797"/>
           </a:xfrm>
         </p:spPr>
         <p:txBody>
           <a:bodyPr/>
           <a:lstStyle/>
           <a:p>
+            <a:r>
+              <a:rPr lang="en-US" sz="2400" b="1" dirty="0"/>
+              <a:t>The Predictive Power in your Data </a:t>
+            </a:r>
+            <a:br>
+              <a:rPr lang="en-US" sz="2400" b="1" dirty="0"/>
+            </a:br>
             <a:r>
               <a:rPr lang="en-US" dirty="0"/>
               <a:t>Evaluating the </a:t>
@@ -15812,7 +17258,7 @@
         </p:blipFill>
         <p:spPr>
           <a:xfrm>
-            <a:off x="1451244" y="1159668"/>
+            <a:off x="1451244" y="1400534"/>
             <a:ext cx="6051545" cy="4538663"/>
           </a:xfrm>
           <a:noFill/>
@@ -15865,7 +17311,7 @@
         </p:nvSpPr>
         <p:spPr bwMode="gray">
           <a:xfrm>
-            <a:off x="7724379" y="1828561"/>
+            <a:off x="7724379" y="2069427"/>
             <a:ext cx="3433150" cy="3200876"/>
           </a:xfrm>
           <a:prstGeom prst="rect">
@@ -15881,11 +17327,11 @@
           <a:p>
             <a:r>
               <a:rPr lang="de-DE" dirty="0"/>
-              <a:t>Average Daily </a:t>
+              <a:t>Average </a:t>
             </a:r>
             <a:r>
               <a:rPr lang="de-DE" dirty="0" err="1"/>
-              <a:t>Warnings</a:t>
+              <a:t>daily</a:t>
             </a:r>
             <a:r>
               <a:rPr lang="de-DE" dirty="0"/>
@@ -15893,7 +17339,7 @@
             </a:r>
             <a:r>
               <a:rPr lang="de-DE" dirty="0" err="1"/>
-              <a:t>when</a:t>
+              <a:t>warnings</a:t>
             </a:r>
             <a:r>
               <a:rPr lang="de-DE" dirty="0"/>
@@ -15901,7 +17347,7 @@
             </a:r>
             <a:r>
               <a:rPr lang="de-DE" dirty="0" err="1"/>
-              <a:t>there</a:t>
+              <a:t>when</a:t>
             </a:r>
             <a:r>
               <a:rPr lang="de-DE" dirty="0"/>
@@ -15909,7 +17355,7 @@
             </a:r>
             <a:r>
               <a:rPr lang="de-DE" dirty="0" err="1"/>
-              <a:t>is</a:t>
+              <a:t>there</a:t>
             </a:r>
             <a:r>
               <a:rPr lang="de-DE" dirty="0"/>
@@ -15917,11 +17363,27 @@
             </a:r>
             <a:r>
               <a:rPr lang="de-DE" dirty="0" err="1"/>
+              <a:t>is</a:t>
+            </a:r>
+            <a:r>
+              <a:rPr lang="de-DE" dirty="0"/>
+              <a:t> </a:t>
+            </a:r>
+            <a:r>
+              <a:rPr lang="de-DE" dirty="0" err="1"/>
               <a:t>no</a:t>
             </a:r>
             <a:r>
               <a:rPr lang="de-DE" dirty="0"/>
-              <a:t> Danger:</a:t>
+              <a:t> </a:t>
+            </a:r>
+            <a:r>
+              <a:rPr lang="de-DE" dirty="0" err="1"/>
+              <a:t>danger</a:t>
+            </a:r>
+            <a:r>
+              <a:rPr lang="de-DE" dirty="0"/>
+              <a:t>:</a:t>
             </a:r>
           </a:p>
           <a:p>
@@ -15946,11 +17408,11 @@
           <a:p>
             <a:r>
               <a:rPr lang="de-DE" dirty="0"/>
-              <a:t>Average Daily </a:t>
+              <a:t>Average </a:t>
             </a:r>
             <a:r>
               <a:rPr lang="de-DE" dirty="0" err="1"/>
-              <a:t>Warnings</a:t>
+              <a:t>daily</a:t>
             </a:r>
             <a:r>
               <a:rPr lang="de-DE" dirty="0"/>
@@ -15958,7 +17420,7 @@
             </a:r>
             <a:r>
               <a:rPr lang="de-DE" dirty="0" err="1"/>
-              <a:t>when</a:t>
+              <a:t>warnings</a:t>
             </a:r>
             <a:r>
               <a:rPr lang="de-DE" dirty="0"/>
@@ -15966,7 +17428,7 @@
             </a:r>
             <a:r>
               <a:rPr lang="de-DE" dirty="0" err="1"/>
-              <a:t>there</a:t>
+              <a:t>when</a:t>
             </a:r>
             <a:r>
               <a:rPr lang="de-DE" dirty="0"/>
@@ -15974,11 +17436,27 @@
             </a:r>
             <a:r>
               <a:rPr lang="de-DE" dirty="0" err="1"/>
+              <a:t>there</a:t>
+            </a:r>
+            <a:r>
+              <a:rPr lang="de-DE" dirty="0"/>
+              <a:t> </a:t>
+            </a:r>
+            <a:r>
+              <a:rPr lang="de-DE" dirty="0" err="1"/>
               <a:t>is</a:t>
             </a:r>
             <a:r>
               <a:rPr lang="de-DE" dirty="0"/>
-              <a:t> Danger:</a:t>
+              <a:t> </a:t>
+            </a:r>
+            <a:r>
+              <a:rPr lang="de-DE" dirty="0" err="1"/>
+              <a:t>danger</a:t>
+            </a:r>
+            <a:r>
+              <a:rPr lang="de-DE" dirty="0"/>
+              <a:t>:</a:t>
             </a:r>
           </a:p>
           <a:p>
@@ -16018,7 +17496,7 @@
 </p:sld>
 </file>
 
-<file path=ppt/slides/slide8.xml><?xml version="1.0" encoding="utf-8"?>
+<file path=ppt/slides/slide9.xml><?xml version="1.0" encoding="utf-8"?>
 <p:sld xmlns:a="http://schemas.openxmlformats.org/drawingml/2006/main" xmlns:r="http://schemas.openxmlformats.org/officeDocument/2006/relationships" xmlns:p="http://schemas.openxmlformats.org/presentationml/2006/main">
   <p:cSld>
     <p:spTree>
@@ -16054,7 +17532,7 @@
         <p:spPr>
           <a:xfrm>
             <a:off x="485775" y="597844"/>
-            <a:ext cx="11220450" cy="332399"/>
+            <a:ext cx="11220450" cy="664797"/>
           </a:xfrm>
         </p:spPr>
         <p:txBody>
@@ -16062,20 +17540,39 @@
           <a:lstStyle/>
           <a:p>
             <a:r>
+              <a:rPr lang="en-US" sz="2400" b="1" dirty="0"/>
+              <a:t>The Predictive Power in your Data</a:t>
+            </a:r>
+            <a:br>
               <a:rPr lang="de-DE" dirty="0"/>
-              <a:t>Next </a:t>
-            </a:r>
+            </a:br>
             <a:r>
               <a:rPr lang="de-DE" dirty="0" err="1"/>
-              <a:t>steps</a:t>
+              <a:t>Failure</a:t>
             </a:r>
             <a:r>
               <a:rPr lang="de-DE" dirty="0"/>
-              <a:t> - </a:t>
+              <a:t> </a:t>
             </a:r>
             <a:r>
               <a:rPr lang="de-DE" dirty="0" err="1"/>
-              <a:t>Deployment</a:t>
+              <a:t>prevention</a:t>
+            </a:r>
+            <a:r>
+              <a:rPr lang="de-DE" dirty="0"/>
+              <a:t> </a:t>
+            </a:r>
+            <a:r>
+              <a:rPr lang="de-DE" dirty="0" err="1"/>
+              <a:t>through</a:t>
+            </a:r>
+            <a:r>
+              <a:rPr lang="de-DE" dirty="0"/>
+              <a:t> real-time </a:t>
+            </a:r>
+            <a:r>
+              <a:rPr lang="de-DE" dirty="0" err="1"/>
+              <a:t>warning</a:t>
             </a:r>
             <a:endParaRPr lang="de-DE" dirty="0"/>
           </a:p>
@@ -16124,7 +17621,7 @@
         <p:spPr bwMode="gray">
           <a:xfrm>
             <a:off x="646770" y="1226634"/>
-            <a:ext cx="8140391" cy="4154984"/>
+            <a:ext cx="8140391" cy="3877985"/>
           </a:xfrm>
           <a:prstGeom prst="rect">
             <a:avLst/>
@@ -16137,9 +17634,21 @@
           </a:bodyPr>
           <a:lstStyle/>
           <a:p>
+            <a:endParaRPr lang="en-US" dirty="0"/>
+          </a:p>
+          <a:p>
+            <a:r>
+              <a:rPr lang="en-US" b="1" dirty="0"/>
+              <a:t>How can we help the employees figure out if the warning is just a fluke?</a:t>
+            </a:r>
+          </a:p>
+          <a:p>
+            <a:endParaRPr lang="en-US" dirty="0"/>
+          </a:p>
+          <a:p>
             <a:r>
               <a:rPr lang="en-US" dirty="0"/>
-              <a:t>Preventing Failure through real-time Warnings</a:t>
+              <a:t>We aggregate the predictions of the past 24 hours</a:t>
             </a:r>
           </a:p>
           <a:p>
@@ -16148,25 +17657,7 @@
           <a:p>
             <a:r>
               <a:rPr lang="en-US" dirty="0"/>
-              <a:t>How can we help the employees figuring out if the warning is just a fluke?</a:t>
-            </a:r>
-          </a:p>
-          <a:p>
-            <a:endParaRPr lang="en-US" dirty="0"/>
-          </a:p>
-          <a:p>
-            <a:r>
-              <a:rPr lang="en-US" dirty="0"/>
-              <a:t>Aggregating the predictions of the past 24 hours</a:t>
-            </a:r>
-          </a:p>
-          <a:p>
-            <a:endParaRPr lang="en-US" dirty="0"/>
-          </a:p>
-          <a:p>
-            <a:r>
-              <a:rPr lang="en-US" dirty="0"/>
-              <a:t>Based off of these aggregations' multiple approaches:</a:t>
+              <a:t>Based off these aggregations' multiple approaches:</a:t>
             </a:r>
           </a:p>
           <a:p>
@@ -16228,357 +17719,6 @@
     <p:extLst>
       <p:ext uri="{BB962C8B-B14F-4D97-AF65-F5344CB8AC3E}">
         <p14:creationId xmlns:p14="http://schemas.microsoft.com/office/powerpoint/2010/main" val="2040450984"/>
-      </p:ext>
-    </p:extLst>
-  </p:cSld>
-  <p:clrMapOvr>
-    <a:masterClrMapping/>
-  </p:clrMapOvr>
-</p:sld>
-</file>
-
-<file path=ppt/slides/slide9.xml><?xml version="1.0" encoding="utf-8"?>
-<p:sld xmlns:a="http://schemas.openxmlformats.org/drawingml/2006/main" xmlns:r="http://schemas.openxmlformats.org/officeDocument/2006/relationships" xmlns:p="http://schemas.openxmlformats.org/presentationml/2006/main">
-  <p:cSld>
-    <p:spTree>
-      <p:nvGrpSpPr>
-        <p:cNvPr id="1" name=""/>
-        <p:cNvGrpSpPr/>
-        <p:nvPr/>
-      </p:nvGrpSpPr>
-      <p:grpSpPr>
-        <a:xfrm>
-          <a:off x="0" y="0"/>
-          <a:ext cx="0" cy="0"/>
-          <a:chOff x="0" y="0"/>
-          <a:chExt cx="0" cy="0"/>
-        </a:xfrm>
-      </p:grpSpPr>
-      <p:sp>
-        <p:nvSpPr>
-          <p:cNvPr id="2" name="Title 1">
-            <a:extLst>
-              <a:ext uri="{FF2B5EF4-FFF2-40B4-BE49-F238E27FC236}">
-                <a16:creationId xmlns:a16="http://schemas.microsoft.com/office/drawing/2014/main" id="{B4928B7A-4834-4A6A-A3FB-54AC5234173C}"/>
-              </a:ext>
-            </a:extLst>
-          </p:cNvPr>
-          <p:cNvSpPr>
-            <a:spLocks noGrp="1"/>
-          </p:cNvSpPr>
-          <p:nvPr>
-            <p:ph type="title"/>
-          </p:nvPr>
-        </p:nvSpPr>
-        <p:spPr/>
-        <p:txBody>
-          <a:bodyPr/>
-          <a:lstStyle/>
-          <a:p>
-            <a:r>
-              <a:rPr lang="de-DE" dirty="0" err="1"/>
-              <a:t>Going</a:t>
-            </a:r>
-            <a:r>
-              <a:rPr lang="de-DE" dirty="0"/>
-              <a:t> </a:t>
-            </a:r>
-            <a:r>
-              <a:rPr lang="de-DE" dirty="0" err="1"/>
-              <a:t>beyond</a:t>
-            </a:r>
-            <a:r>
-              <a:rPr lang="de-DE" dirty="0"/>
-              <a:t> … and </a:t>
-            </a:r>
-            <a:r>
-              <a:rPr lang="de-DE" dirty="0" err="1"/>
-              <a:t>are</a:t>
-            </a:r>
-            <a:r>
-              <a:rPr lang="de-DE" dirty="0"/>
-              <a:t> </a:t>
-            </a:r>
-            <a:r>
-              <a:rPr lang="de-DE" dirty="0" err="1"/>
-              <a:t>there</a:t>
-            </a:r>
-            <a:r>
-              <a:rPr lang="de-DE" dirty="0"/>
-              <a:t> </a:t>
-            </a:r>
-            <a:r>
-              <a:rPr lang="de-DE" dirty="0" err="1"/>
-              <a:t>any</a:t>
-            </a:r>
-            <a:r>
-              <a:rPr lang="de-DE" dirty="0"/>
-              <a:t> </a:t>
-            </a:r>
-            <a:r>
-              <a:rPr lang="de-DE" dirty="0" err="1"/>
-              <a:t>questions</a:t>
-            </a:r>
-            <a:r>
-              <a:rPr lang="de-DE" dirty="0"/>
-              <a:t>?</a:t>
-            </a:r>
-          </a:p>
-        </p:txBody>
-      </p:sp>
-      <p:sp>
-        <p:nvSpPr>
-          <p:cNvPr id="3" name="Content Placeholder 2">
-            <a:extLst>
-              <a:ext uri="{FF2B5EF4-FFF2-40B4-BE49-F238E27FC236}">
-                <a16:creationId xmlns:a16="http://schemas.microsoft.com/office/drawing/2014/main" id="{67610E84-065B-4FA1-B7D1-C980464A23F0}"/>
-              </a:ext>
-            </a:extLst>
-          </p:cNvPr>
-          <p:cNvSpPr>
-            <a:spLocks noGrp="1"/>
-          </p:cNvSpPr>
-          <p:nvPr>
-            <p:ph idx="1"/>
-          </p:nvPr>
-        </p:nvSpPr>
-        <p:spPr/>
-        <p:txBody>
-          <a:bodyPr>
-            <a:normAutofit/>
-          </a:bodyPr>
-          <a:lstStyle/>
-          <a:p>
-            <a:r>
-              <a:rPr lang="de-DE" sz="1800" dirty="0" err="1"/>
-              <a:t>Determining</a:t>
-            </a:r>
-            <a:r>
-              <a:rPr lang="de-DE" sz="1800" dirty="0"/>
-              <a:t> and </a:t>
-            </a:r>
-            <a:r>
-              <a:rPr lang="de-DE" sz="1800" dirty="0" err="1"/>
-              <a:t>Finding</a:t>
-            </a:r>
-            <a:r>
-              <a:rPr lang="de-DE" sz="1800" dirty="0"/>
-              <a:t> </a:t>
-            </a:r>
-            <a:r>
-              <a:rPr lang="de-DE" sz="1800" dirty="0" err="1"/>
-              <a:t>the</a:t>
-            </a:r>
-            <a:r>
-              <a:rPr lang="de-DE" sz="1800" dirty="0"/>
-              <a:t> optimal </a:t>
-            </a:r>
-            <a:r>
-              <a:rPr lang="de-DE" sz="1800" dirty="0" err="1"/>
-              <a:t>warning</a:t>
-            </a:r>
-            <a:r>
-              <a:rPr lang="de-DE" sz="1800" dirty="0"/>
-              <a:t> </a:t>
-            </a:r>
-            <a:r>
-              <a:rPr lang="de-DE" sz="1800" dirty="0" err="1"/>
-              <a:t>window</a:t>
-            </a:r>
-            <a:r>
-              <a:rPr lang="de-DE" sz="1800" dirty="0"/>
-              <a:t> </a:t>
-            </a:r>
-          </a:p>
-          <a:p>
-            <a:pPr lvl="1"/>
-            <a:r>
-              <a:rPr lang="de-DE" sz="1800" dirty="0" err="1"/>
-              <a:t>How</a:t>
-            </a:r>
-            <a:r>
-              <a:rPr lang="de-DE" sz="1800" dirty="0"/>
-              <a:t> </a:t>
-            </a:r>
-            <a:r>
-              <a:rPr lang="de-DE" sz="1800" dirty="0" err="1"/>
-              <a:t>much</a:t>
-            </a:r>
-            <a:r>
-              <a:rPr lang="de-DE" sz="1800" dirty="0"/>
-              <a:t> time do </a:t>
-            </a:r>
-            <a:r>
-              <a:rPr lang="de-DE" sz="1800" dirty="0" err="1"/>
-              <a:t>employees</a:t>
-            </a:r>
-            <a:r>
-              <a:rPr lang="de-DE" sz="1800" dirty="0"/>
-              <a:t> </a:t>
-            </a:r>
-            <a:r>
-              <a:rPr lang="de-DE" sz="1800" dirty="0" err="1"/>
-              <a:t>need</a:t>
-            </a:r>
-            <a:r>
-              <a:rPr lang="de-DE" sz="1800" dirty="0"/>
-              <a:t> in </a:t>
-            </a:r>
-            <a:r>
-              <a:rPr lang="de-DE" sz="1800" dirty="0" err="1"/>
-              <a:t>order</a:t>
-            </a:r>
-            <a:r>
-              <a:rPr lang="de-DE" sz="1800" dirty="0"/>
-              <a:t> </a:t>
-            </a:r>
-            <a:r>
-              <a:rPr lang="de-DE" sz="1800" dirty="0" err="1"/>
-              <a:t>to</a:t>
-            </a:r>
-            <a:r>
-              <a:rPr lang="de-DE" sz="1800" dirty="0"/>
-              <a:t> </a:t>
-            </a:r>
-            <a:r>
-              <a:rPr lang="de-DE" sz="1800" dirty="0" err="1"/>
-              <a:t>react</a:t>
-            </a:r>
-            <a:r>
-              <a:rPr lang="de-DE" sz="1800" dirty="0"/>
-              <a:t>?</a:t>
-            </a:r>
-          </a:p>
-          <a:p>
-            <a:pPr marL="180000" lvl="1" indent="0">
-              <a:buNone/>
-            </a:pPr>
-            <a:endParaRPr lang="de-DE" sz="1800" dirty="0"/>
-          </a:p>
-          <a:p>
-            <a:r>
-              <a:rPr lang="de-DE" sz="1800" dirty="0"/>
-              <a:t>Even </a:t>
-            </a:r>
-            <a:r>
-              <a:rPr lang="de-DE" sz="1800" dirty="0" err="1"/>
-              <a:t>more</a:t>
-            </a:r>
-            <a:r>
-              <a:rPr lang="de-DE" sz="1800" dirty="0"/>
-              <a:t> </a:t>
-            </a:r>
-            <a:r>
-              <a:rPr lang="de-DE" sz="1800" dirty="0" err="1"/>
-              <a:t>advanced</a:t>
-            </a:r>
-            <a:r>
-              <a:rPr lang="de-DE" sz="1800" dirty="0"/>
-              <a:t> </a:t>
-            </a:r>
-            <a:r>
-              <a:rPr lang="de-DE" sz="1800" dirty="0" err="1"/>
-              <a:t>usage</a:t>
-            </a:r>
-            <a:r>
-              <a:rPr lang="de-DE" sz="1800" dirty="0"/>
-              <a:t> </a:t>
-            </a:r>
-            <a:r>
-              <a:rPr lang="de-DE" sz="1800" dirty="0" err="1"/>
-              <a:t>of</a:t>
-            </a:r>
-            <a:r>
-              <a:rPr lang="de-DE" sz="1800" dirty="0"/>
-              <a:t> Deep Learning (RNN, LSTM) </a:t>
-            </a:r>
-          </a:p>
-          <a:p>
-            <a:pPr marL="0" indent="0">
-              <a:buNone/>
-            </a:pPr>
-            <a:endParaRPr lang="de-DE" sz="1800" dirty="0"/>
-          </a:p>
-          <a:p>
-            <a:r>
-              <a:rPr lang="de-DE" sz="1800" dirty="0"/>
-              <a:t>Sensor Dashboard </a:t>
-            </a:r>
-            <a:r>
-              <a:rPr lang="de-DE" sz="1800" dirty="0" err="1"/>
-              <a:t>with</a:t>
-            </a:r>
-            <a:r>
-              <a:rPr lang="de-DE" sz="1800" dirty="0"/>
-              <a:t> </a:t>
-            </a:r>
-            <a:r>
-              <a:rPr lang="de-DE" sz="1800" dirty="0" err="1"/>
-              <a:t>integrated</a:t>
-            </a:r>
-            <a:r>
-              <a:rPr lang="de-DE" sz="1800" dirty="0"/>
-              <a:t> </a:t>
-            </a:r>
-            <a:r>
-              <a:rPr lang="de-DE" sz="1800" dirty="0" err="1"/>
-              <a:t>Anomaly</a:t>
-            </a:r>
-            <a:r>
-              <a:rPr lang="de-DE" sz="1800" dirty="0"/>
-              <a:t> </a:t>
-            </a:r>
-            <a:r>
-              <a:rPr lang="de-DE" sz="1800" dirty="0" err="1"/>
-              <a:t>Detection</a:t>
-            </a:r>
-            <a:endParaRPr lang="de-DE" sz="1800" dirty="0"/>
-          </a:p>
-          <a:p>
-            <a:endParaRPr lang="en-US" sz="1800" dirty="0"/>
-          </a:p>
-          <a:p>
-            <a:endParaRPr lang="de-DE" sz="1800" dirty="0"/>
-          </a:p>
-        </p:txBody>
-      </p:sp>
-      <p:sp>
-        <p:nvSpPr>
-          <p:cNvPr id="4" name="Text Placeholder 3">
-            <a:extLst>
-              <a:ext uri="{FF2B5EF4-FFF2-40B4-BE49-F238E27FC236}">
-                <a16:creationId xmlns:a16="http://schemas.microsoft.com/office/drawing/2014/main" id="{A5A1F98E-6D98-4C81-9373-91B82402ABB3}"/>
-              </a:ext>
-            </a:extLst>
-          </p:cNvPr>
-          <p:cNvSpPr>
-            <a:spLocks noGrp="1"/>
-          </p:cNvSpPr>
-          <p:nvPr>
-            <p:ph type="body" sz="quarter" idx="10"/>
-          </p:nvPr>
-        </p:nvSpPr>
-        <p:spPr>
-          <a:xfrm>
-            <a:off x="485775" y="268697"/>
-            <a:ext cx="10096500" cy="246221"/>
-          </a:xfrm>
-        </p:spPr>
-        <p:txBody>
-          <a:bodyPr/>
-          <a:lstStyle/>
-          <a:p>
-            <a:r>
-              <a:rPr lang="en-US" dirty="0"/>
-              <a:t>Predictive Maintenance - Always one step ahead of failure with AI</a:t>
-            </a:r>
-          </a:p>
-        </p:txBody>
-      </p:sp>
-    </p:spTree>
-    <p:extLst>
-      <p:ext uri="{BB962C8B-B14F-4D97-AF65-F5344CB8AC3E}">
-        <p14:creationId xmlns:p14="http://schemas.microsoft.com/office/powerpoint/2010/main" val="1942909483"/>
       </p:ext>
     </p:extLst>
   </p:cSld>
@@ -16692,6 +17832,12 @@
 </file>
 
 <file path=ppt/tags/tag25.xml><?xml version="1.0" encoding="utf-8"?>
+<p:tagLst xmlns:a="http://schemas.openxmlformats.org/drawingml/2006/main" xmlns:r="http://schemas.openxmlformats.org/officeDocument/2006/relationships" xmlns:p="http://schemas.openxmlformats.org/presentationml/2006/main">
+  <p:tag name="THINKCELLSHAPEDONOTDELETE" val="thinkcellActiveDocDoNotDelete"/>
+</p:tagLst>
+</file>
+
+<file path=ppt/tags/tag26.xml><?xml version="1.0" encoding="utf-8"?>
 <p:tagLst xmlns:a="http://schemas.openxmlformats.org/drawingml/2006/main" xmlns:r="http://schemas.openxmlformats.org/officeDocument/2006/relationships" xmlns:p="http://schemas.openxmlformats.org/presentationml/2006/main">
   <p:tag name="THINKCELLSHAPEDONOTDELETE" val="t.cAgaVACWlRhzpMX00Mh4Q"/>
 </p:tagLst>
@@ -17609,6 +18755,12 @@
 </file>
 
 <file path=customXml/item1.xml><?xml version="1.0" encoding="utf-8"?>
+<p:properties xmlns:p="http://schemas.microsoft.com/office/2006/metadata/properties" xmlns:xsi="http://www.w3.org/2001/XMLSchema-instance" xmlns:pc="http://schemas.microsoft.com/office/infopath/2007/PartnerControls">
+  <documentManagement/>
+</p:properties>
+</file>
+
+<file path=customXml/item2.xml><?xml version="1.0" encoding="utf-8"?>
 <ct:contentTypeSchema xmlns:ct="http://schemas.microsoft.com/office/2006/metadata/contentType" xmlns:ma="http://schemas.microsoft.com/office/2006/metadata/properties/metaAttributes" ct:_="" ma:_="" ma:contentTypeName="Document" ma:contentTypeID="0x01010051D354C67B390B44813989836B252C14" ma:contentTypeVersion="12" ma:contentTypeDescription="Create a new document." ma:contentTypeScope="" ma:versionID="cfefa8ac62f2a2e6ec11ecf00ece8bf4">
   <xsd:schema xmlns:xsd="http://www.w3.org/2001/XMLSchema" xmlns:xs="http://www.w3.org/2001/XMLSchema" xmlns:p="http://schemas.microsoft.com/office/2006/metadata/properties" xmlns:ns2="e1ab5b9b-46fe-4d6c-8c20-874c19d8ed7f" xmlns:ns3="5008a69f-1eed-4600-99f4-2f1726d838fd" targetNamespace="http://schemas.microsoft.com/office/2006/metadata/properties" ma:root="true" ma:fieldsID="7f53316fa429937191671e7e66b06fc5" ns2:_="" ns3:_="">
     <xsd:import namespace="e1ab5b9b-46fe-4d6c-8c20-874c19d8ed7f"/>
@@ -17825,12 +18977,6 @@
 </ct:contentTypeSchema>
 </file>
 
-<file path=customXml/item2.xml><?xml version="1.0" encoding="utf-8"?>
-<p:properties xmlns:p="http://schemas.microsoft.com/office/2006/metadata/properties" xmlns:xsi="http://www.w3.org/2001/XMLSchema-instance" xmlns:pc="http://schemas.microsoft.com/office/infopath/2007/PartnerControls">
-  <documentManagement/>
-</p:properties>
-</file>
-
 <file path=customXml/item3.xml><?xml version="1.0" encoding="utf-8"?>
 <?mso-contentType ?>
 <FormTemplates xmlns="http://schemas.microsoft.com/sharepoint/v3/contenttype/forms">
@@ -17841,6 +18987,23 @@
 </file>
 
 <file path=customXml/itemProps1.xml><?xml version="1.0" encoding="utf-8"?>
+<ds:datastoreItem xmlns:ds="http://schemas.openxmlformats.org/officeDocument/2006/customXml" ds:itemID="{601D5AB0-ACAE-42DE-A96F-43EFFC5E10DE}">
+  <ds:schemaRefs>
+    <ds:schemaRef ds:uri="312fea61-a767-4e94-9b73-c7d3fe4b423e"/>
+    <ds:schemaRef ds:uri="6d6f7f2d-8a03-4f69-ae14-ba2fa6aa5039"/>
+    <ds:schemaRef ds:uri="http://purl.org/dc/dcmitype/"/>
+    <ds:schemaRef ds:uri="http://purl.org/dc/elements/1.1/"/>
+    <ds:schemaRef ds:uri="http://purl.org/dc/terms/"/>
+    <ds:schemaRef ds:uri="http://schemas.microsoft.com/office/2006/documentManagement/types"/>
+    <ds:schemaRef ds:uri="http://schemas.microsoft.com/office/2006/metadata/properties"/>
+    <ds:schemaRef ds:uri="http://schemas.microsoft.com/office/infopath/2007/PartnerControls"/>
+    <ds:schemaRef ds:uri="http://schemas.openxmlformats.org/package/2006/metadata/core-properties"/>
+    <ds:schemaRef ds:uri="http://www.w3.org/XML/1998/namespace"/>
+  </ds:schemaRefs>
+</ds:datastoreItem>
+</file>
+
+<file path=customXml/itemProps2.xml><?xml version="1.0" encoding="utf-8"?>
 <ds:datastoreItem xmlns:ds="http://schemas.openxmlformats.org/officeDocument/2006/customXml" ds:itemID="{8980358C-1AF2-4E46-A3CD-108FC8799090}">
   <ds:schemaRefs>
     <ds:schemaRef ds:uri="http://schemas.microsoft.com/office/2006/metadata/contentType"/>
@@ -17859,23 +19022,6 @@
 </ds:datastoreItem>
 </file>
 
-<file path=customXml/itemProps2.xml><?xml version="1.0" encoding="utf-8"?>
-<ds:datastoreItem xmlns:ds="http://schemas.openxmlformats.org/officeDocument/2006/customXml" ds:itemID="{601D5AB0-ACAE-42DE-A96F-43EFFC5E10DE}">
-  <ds:schemaRefs>
-    <ds:schemaRef ds:uri="312fea61-a767-4e94-9b73-c7d3fe4b423e"/>
-    <ds:schemaRef ds:uri="6d6f7f2d-8a03-4f69-ae14-ba2fa6aa5039"/>
-    <ds:schemaRef ds:uri="http://purl.org/dc/dcmitype/"/>
-    <ds:schemaRef ds:uri="http://purl.org/dc/elements/1.1/"/>
-    <ds:schemaRef ds:uri="http://purl.org/dc/terms/"/>
-    <ds:schemaRef ds:uri="http://schemas.microsoft.com/office/2006/documentManagement/types"/>
-    <ds:schemaRef ds:uri="http://schemas.microsoft.com/office/2006/metadata/properties"/>
-    <ds:schemaRef ds:uri="http://schemas.microsoft.com/office/infopath/2007/PartnerControls"/>
-    <ds:schemaRef ds:uri="http://schemas.openxmlformats.org/package/2006/metadata/core-properties"/>
-    <ds:schemaRef ds:uri="http://www.w3.org/XML/1998/namespace"/>
-  </ds:schemaRefs>
-</ds:datastoreItem>
-</file>
-
 <file path=customXml/itemProps3.xml><?xml version="1.0" encoding="utf-8"?>
 <ds:datastoreItem xmlns:ds="http://schemas.openxmlformats.org/officeDocument/2006/customXml" ds:itemID="{6C5CAD96-48DD-44FA-A789-355BB4E12847}">
   <ds:schemaRefs>

</xml_diff>